<commit_message>
update slides and add corresponding scripts
</commit_message>
<xml_diff>
--- a/Bash-scripting-guid.pptx
+++ b/Bash-scripting-guid.pptx
@@ -53,9 +53,23 @@
     <p:sldId id="304" r:id="rId47"/>
     <p:sldId id="302" r:id="rId48"/>
     <p:sldId id="305" r:id="rId49"/>
-    <p:sldId id="311" r:id="rId50"/>
-    <p:sldId id="267" r:id="rId51"/>
-    <p:sldId id="270" r:id="rId52"/>
+    <p:sldId id="321" r:id="rId50"/>
+    <p:sldId id="322" r:id="rId51"/>
+    <p:sldId id="312" r:id="rId52"/>
+    <p:sldId id="311" r:id="rId53"/>
+    <p:sldId id="313" r:id="rId54"/>
+    <p:sldId id="314" r:id="rId55"/>
+    <p:sldId id="315" r:id="rId56"/>
+    <p:sldId id="316" r:id="rId57"/>
+    <p:sldId id="317" r:id="rId58"/>
+    <p:sldId id="318" r:id="rId59"/>
+    <p:sldId id="319" r:id="rId60"/>
+    <p:sldId id="320" r:id="rId61"/>
+    <p:sldId id="324" r:id="rId62"/>
+    <p:sldId id="325" r:id="rId63"/>
+    <p:sldId id="323" r:id="rId64"/>
+    <p:sldId id="267" r:id="rId65"/>
+    <p:sldId id="270" r:id="rId66"/>
   </p:sldIdLst>
   <p:sldSz cx="12192000" cy="6858000"/>
   <p:notesSz cx="6858000" cy="9144000"/>
@@ -351,7 +365,7 @@
             <a:fld id="{B61BEF0D-F0BB-DE4B-95CE-6DB70DBA9567}" type="datetimeFigureOut">
               <a:rPr lang="en-US" dirty="0"/>
               <a:pPr/>
-              <a:t>8/7/2016</a:t>
+              <a:t>8/8/2016</a:t>
             </a:fld>
             <a:endParaRPr lang="en-US" dirty="0"/>
           </a:p>
@@ -686,7 +700,7 @@
             <a:fld id="{B61BEF0D-F0BB-DE4B-95CE-6DB70DBA9567}" type="datetimeFigureOut">
               <a:rPr lang="en-US" dirty="0"/>
               <a:pPr/>
-              <a:t>8/7/2016</a:t>
+              <a:t>8/8/2016</a:t>
             </a:fld>
             <a:endParaRPr lang="en-US" dirty="0"/>
           </a:p>
@@ -1084,7 +1098,7 @@
             <a:fld id="{B61BEF0D-F0BB-DE4B-95CE-6DB70DBA9567}" type="datetimeFigureOut">
               <a:rPr lang="en-US" dirty="0"/>
               <a:pPr/>
-              <a:t>8/7/2016</a:t>
+              <a:t>8/8/2016</a:t>
             </a:fld>
             <a:endParaRPr lang="en-US" dirty="0"/>
           </a:p>
@@ -1417,7 +1431,7 @@
             <a:fld id="{B61BEF0D-F0BB-DE4B-95CE-6DB70DBA9567}" type="datetimeFigureOut">
               <a:rPr lang="en-US" dirty="0"/>
               <a:pPr/>
-              <a:t>8/7/2016</a:t>
+              <a:t>8/8/2016</a:t>
             </a:fld>
             <a:endParaRPr lang="en-US" dirty="0"/>
           </a:p>
@@ -1734,7 +1748,7 @@
             <a:fld id="{B61BEF0D-F0BB-DE4B-95CE-6DB70DBA9567}" type="datetimeFigureOut">
               <a:rPr lang="en-US" dirty="0"/>
               <a:pPr/>
-              <a:t>8/7/2016</a:t>
+              <a:t>8/8/2016</a:t>
             </a:fld>
             <a:endParaRPr lang="en-US" dirty="0"/>
           </a:p>
@@ -2127,7 +2141,7 @@
             <a:fld id="{B61BEF0D-F0BB-DE4B-95CE-6DB70DBA9567}" type="datetimeFigureOut">
               <a:rPr lang="en-US" dirty="0"/>
               <a:pPr/>
-              <a:t>8/7/2016</a:t>
+              <a:t>8/8/2016</a:t>
             </a:fld>
             <a:endParaRPr lang="en-US" dirty="0"/>
           </a:p>
@@ -2381,7 +2395,7 @@
             <a:fld id="{B61BEF0D-F0BB-DE4B-95CE-6DB70DBA9567}" type="datetimeFigureOut">
               <a:rPr lang="en-US" dirty="0"/>
               <a:pPr/>
-              <a:t>8/7/2016</a:t>
+              <a:t>8/8/2016</a:t>
             </a:fld>
             <a:endParaRPr lang="en-US" dirty="0"/>
           </a:p>
@@ -2640,7 +2654,7 @@
             <a:fld id="{B61BEF0D-F0BB-DE4B-95CE-6DB70DBA9567}" type="datetimeFigureOut">
               <a:rPr lang="en-US" dirty="0"/>
               <a:pPr/>
-              <a:t>8/7/2016</a:t>
+              <a:t>8/8/2016</a:t>
             </a:fld>
             <a:endParaRPr lang="en-US" dirty="0"/>
           </a:p>
@@ -2899,7 +2913,7 @@
             <a:fld id="{B61BEF0D-F0BB-DE4B-95CE-6DB70DBA9567}" type="datetimeFigureOut">
               <a:rPr lang="en-US" dirty="0"/>
               <a:pPr/>
-              <a:t>8/7/2016</a:t>
+              <a:t>8/8/2016</a:t>
             </a:fld>
             <a:endParaRPr lang="en-US" dirty="0"/>
           </a:p>
@@ -3225,7 +3239,7 @@
             <a:fld id="{B61BEF0D-F0BB-DE4B-95CE-6DB70DBA9567}" type="datetimeFigureOut">
               <a:rPr lang="en-US" dirty="0"/>
               <a:pPr/>
-              <a:t>8/7/2016</a:t>
+              <a:t>8/8/2016</a:t>
             </a:fld>
             <a:endParaRPr lang="en-US" dirty="0"/>
           </a:p>
@@ -3545,7 +3559,7 @@
             <a:fld id="{B61BEF0D-F0BB-DE4B-95CE-6DB70DBA9567}" type="datetimeFigureOut">
               <a:rPr lang="en-US" dirty="0"/>
               <a:pPr/>
-              <a:t>8/7/2016</a:t>
+              <a:t>8/8/2016</a:t>
             </a:fld>
             <a:endParaRPr lang="en-US" dirty="0"/>
           </a:p>
@@ -3999,7 +4013,7 @@
             <a:fld id="{B61BEF0D-F0BB-DE4B-95CE-6DB70DBA9567}" type="datetimeFigureOut">
               <a:rPr lang="en-US" dirty="0"/>
               <a:pPr/>
-              <a:t>8/7/2016</a:t>
+              <a:t>8/8/2016</a:t>
             </a:fld>
             <a:endParaRPr lang="en-US" dirty="0"/>
           </a:p>
@@ -4201,7 +4215,7 @@
             <a:fld id="{B61BEF0D-F0BB-DE4B-95CE-6DB70DBA9567}" type="datetimeFigureOut">
               <a:rPr lang="en-US" dirty="0"/>
               <a:pPr/>
-              <a:t>8/7/2016</a:t>
+              <a:t>8/8/2016</a:t>
             </a:fld>
             <a:endParaRPr lang="en-US" dirty="0"/>
           </a:p>
@@ -4375,7 +4389,7 @@
             <a:fld id="{B61BEF0D-F0BB-DE4B-95CE-6DB70DBA9567}" type="datetimeFigureOut">
               <a:rPr lang="en-US" dirty="0"/>
               <a:pPr/>
-              <a:t>8/7/2016</a:t>
+              <a:t>8/8/2016</a:t>
             </a:fld>
             <a:endParaRPr lang="en-US" dirty="0"/>
           </a:p>
@@ -4705,7 +4719,7 @@
             <a:fld id="{B61BEF0D-F0BB-DE4B-95CE-6DB70DBA9567}" type="datetimeFigureOut">
               <a:rPr lang="en-US" dirty="0"/>
               <a:pPr/>
-              <a:t>8/7/2016</a:t>
+              <a:t>8/8/2016</a:t>
             </a:fld>
             <a:endParaRPr lang="en-US" dirty="0"/>
           </a:p>
@@ -5047,7 +5061,7 @@
             <a:fld id="{B61BEF0D-F0BB-DE4B-95CE-6DB70DBA9567}" type="datetimeFigureOut">
               <a:rPr lang="en-US" dirty="0"/>
               <a:pPr/>
-              <a:t>8/7/2016</a:t>
+              <a:t>8/8/2016</a:t>
             </a:fld>
             <a:endParaRPr lang="en-US" dirty="0"/>
           </a:p>
@@ -7098,7 +7112,7 @@
             <a:fld id="{B61BEF0D-F0BB-DE4B-95CE-6DB70DBA9567}" type="datetimeFigureOut">
               <a:rPr lang="en-US" dirty="0"/>
               <a:pPr/>
-              <a:t>8/7/2016</a:t>
+              <a:t>8/8/2016</a:t>
             </a:fld>
             <a:endParaRPr lang="en-US" dirty="0"/>
           </a:p>
@@ -9728,6 +9742,13 @@
   <p:clrMapOvr>
     <a:masterClrMapping/>
   </p:clrMapOvr>
+  <p:timing>
+    <p:tnLst>
+      <p:par>
+        <p:cTn id="1" dur="indefinite" restart="never" nodeType="tmRoot"/>
+      </p:par>
+    </p:tnLst>
+  </p:timing>
 </p:sld>
 </file>
 
@@ -9997,6 +10018,13 @@
   <p:clrMapOvr>
     <a:masterClrMapping/>
   </p:clrMapOvr>
+  <p:timing>
+    <p:tnLst>
+      <p:par>
+        <p:cTn id="1" dur="indefinite" restart="never" nodeType="tmRoot"/>
+      </p:par>
+    </p:tnLst>
+  </p:timing>
 </p:sld>
 </file>
 
@@ -10337,6 +10365,13 @@
   <p:clrMapOvr>
     <a:masterClrMapping/>
   </p:clrMapOvr>
+  <p:timing>
+    <p:tnLst>
+      <p:par>
+        <p:cTn id="1" dur="indefinite" restart="never" nodeType="tmRoot"/>
+      </p:par>
+    </p:tnLst>
+  </p:timing>
 </p:sld>
 </file>
 
@@ -10494,6 +10529,13 @@
   <p:clrMapOvr>
     <a:masterClrMapping/>
   </p:clrMapOvr>
+  <p:timing>
+    <p:tnLst>
+      <p:par>
+        <p:cTn id="1" dur="indefinite" restart="never" nodeType="tmRoot"/>
+      </p:par>
+    </p:tnLst>
+  </p:timing>
 </p:sld>
 </file>
 
@@ -10815,6 +10857,13 @@
   <p:clrMapOvr>
     <a:masterClrMapping/>
   </p:clrMapOvr>
+  <p:timing>
+    <p:tnLst>
+      <p:par>
+        <p:cTn id="1" dur="indefinite" restart="never" nodeType="tmRoot"/>
+      </p:par>
+    </p:tnLst>
+  </p:timing>
 </p:sld>
 </file>
 
@@ -11260,6 +11309,13 @@
   <p:clrMapOvr>
     <a:masterClrMapping/>
   </p:clrMapOvr>
+  <p:timing>
+    <p:tnLst>
+      <p:par>
+        <p:cTn id="1" dur="indefinite" restart="never" nodeType="tmRoot"/>
+      </p:par>
+    </p:tnLst>
+  </p:timing>
 </p:sld>
 </file>
 
@@ -11316,7 +11372,7 @@
         <p:spPr/>
         <p:txBody>
           <a:bodyPr>
-            <a:normAutofit/>
+            <a:normAutofit lnSpcReduction="10000"/>
           </a:bodyPr>
           <a:lstStyle/>
           <a:p>
@@ -11487,6 +11543,58 @@
               <a:rPr lang="en-US" altLang="zh-CN" dirty="0" smtClean="0"/>
               <a:t>shift.sh</a:t>
             </a:r>
+          </a:p>
+          <a:p>
+            <a:pPr marL="0" indent="0">
+              <a:buNone/>
+            </a:pPr>
+            <a:r>
+              <a:rPr lang="zh-CN" altLang="en-US" dirty="0" smtClean="0"/>
+              <a:t>可以给</a:t>
+            </a:r>
+            <a:r>
+              <a:rPr lang="en-US" altLang="zh-CN" dirty="0" err="1" smtClean="0"/>
+              <a:t>shitf</a:t>
+            </a:r>
+            <a:r>
+              <a:rPr lang="zh-CN" altLang="en-US" dirty="0" smtClean="0"/>
+              <a:t>命令指定一个参数，表明要移动多少个位置参数。</a:t>
+            </a:r>
+            <a:r>
+              <a:rPr lang="en-US" altLang="zh-CN" dirty="0" smtClean="0"/>
+              <a:t>e.g. shift-past.sh</a:t>
+            </a:r>
+            <a:endParaRPr lang="en-US" altLang="zh-CN" dirty="0" smtClean="0"/>
+          </a:p>
+          <a:p>
+            <a:pPr marL="0" indent="0">
+              <a:buNone/>
+            </a:pPr>
+            <a:r>
+              <a:rPr lang="zh-CN" altLang="en-US" dirty="0"/>
+              <a:t>在将参数</a:t>
+            </a:r>
+            <a:r>
+              <a:rPr lang="zh-CN" altLang="en-US" dirty="0" smtClean="0"/>
+              <a:t>传递给函数的时候</a:t>
+            </a:r>
+            <a:r>
+              <a:rPr lang="zh-CN" altLang="en-US" dirty="0"/>
+              <a:t>，</a:t>
+            </a:r>
+            <a:r>
+              <a:rPr lang="en-US" altLang="zh-CN" dirty="0" smtClean="0"/>
+              <a:t>shift</a:t>
+            </a:r>
+            <a:r>
+              <a:rPr lang="zh-CN" altLang="en-US" dirty="0"/>
+              <a:t>命令的工作方式也</a:t>
+            </a:r>
+            <a:r>
+              <a:rPr lang="zh-CN" altLang="en-US" dirty="0" smtClean="0"/>
+              <a:t>差不多。</a:t>
+            </a:r>
+            <a:endParaRPr lang="en-US" altLang="zh-CN" dirty="0" smtClean="0"/>
           </a:p>
           <a:p>
             <a:pPr>
@@ -13488,7 +13596,22 @@
           <a:p>
             <a:r>
               <a:rPr lang="zh-CN" altLang="en-US" dirty="0" smtClean="0"/>
-              <a:t>语句和表达式</a:t>
+              <a:t>语句和</a:t>
+            </a:r>
+            <a:r>
+              <a:rPr lang="zh-CN" altLang="en-US" dirty="0" smtClean="0"/>
+              <a:t>表达式</a:t>
+            </a:r>
+            <a:endParaRPr lang="en-US" altLang="zh-CN" dirty="0" smtClean="0"/>
+          </a:p>
+          <a:p>
+            <a:r>
+              <a:rPr lang="zh-CN" altLang="en-US" dirty="0"/>
+              <a:t>内</a:t>
+            </a:r>
+            <a:r>
+              <a:rPr lang="zh-CN" altLang="en-US" dirty="0" smtClean="0"/>
+              <a:t>建命令</a:t>
             </a:r>
             <a:endParaRPr lang="en-US" altLang="zh-CN" dirty="0" smtClean="0"/>
           </a:p>
@@ -15717,6 +15840,13 @@
   <p:clrMapOvr>
     <a:masterClrMapping/>
   </p:clrMapOvr>
+  <p:timing>
+    <p:tnLst>
+      <p:par>
+        <p:cTn id="1" dur="indefinite" restart="never" nodeType="tmRoot"/>
+      </p:par>
+    </p:tnLst>
+  </p:timing>
 </p:sld>
 </file>
 
@@ -15990,6 +16120,13 @@
   <p:clrMapOvr>
     <a:masterClrMapping/>
   </p:clrMapOvr>
+  <p:timing>
+    <p:tnLst>
+      <p:par>
+        <p:cTn id="1" dur="indefinite" restart="never" nodeType="tmRoot"/>
+      </p:par>
+    </p:tnLst>
+  </p:timing>
 </p:sld>
 </file>
 
@@ -16306,6 +16443,13 @@
   <p:clrMapOvr>
     <a:masterClrMapping/>
   </p:clrMapOvr>
+  <p:timing>
+    <p:tnLst>
+      <p:par>
+        <p:cTn id="1" dur="indefinite" restart="never" nodeType="tmRoot"/>
+      </p:par>
+    </p:tnLst>
+  </p:timing>
 </p:sld>
 </file>
 
@@ -17971,11 +18115,7 @@
           <a:p>
             <a:r>
               <a:rPr lang="zh-CN" altLang="en-US" dirty="0" smtClean="0"/>
-              <a:t>条件</a:t>
-            </a:r>
-            <a:r>
-              <a:rPr lang="zh-CN" altLang="en-US" dirty="0" smtClean="0"/>
-              <a:t>测试表达式</a:t>
+              <a:t>条件测试表达式</a:t>
             </a:r>
             <a:endParaRPr lang="en-US" dirty="0"/>
           </a:p>
@@ -18038,15 +18178,7 @@
           <a:p>
             <a:r>
               <a:rPr lang="zh-CN" altLang="en-US" dirty="0" smtClean="0"/>
-              <a:t>条件</a:t>
-            </a:r>
-            <a:r>
-              <a:rPr lang="zh-CN" altLang="en-US" dirty="0" smtClean="0"/>
-              <a:t>测试</a:t>
-            </a:r>
-            <a:r>
-              <a:rPr lang="zh-CN" altLang="en-US" dirty="0" smtClean="0"/>
-              <a:t>结构</a:t>
+              <a:t>条件测试结构</a:t>
             </a:r>
             <a:endParaRPr lang="en-US" altLang="zh-CN" dirty="0" smtClean="0"/>
           </a:p>
@@ -18343,11 +18475,7 @@
           <a:p>
             <a:r>
               <a:rPr lang="zh-CN" altLang="en-US" dirty="0" smtClean="0"/>
-              <a:t>条件</a:t>
-            </a:r>
-            <a:r>
-              <a:rPr lang="zh-CN" altLang="en-US" dirty="0" smtClean="0"/>
-              <a:t>测试表达式</a:t>
+              <a:t>条件测试表达式</a:t>
             </a:r>
             <a:endParaRPr lang="en-US" dirty="0"/>
           </a:p>
@@ -18626,11 +18754,7 @@
           <a:p>
             <a:r>
               <a:rPr lang="zh-CN" altLang="en-US" dirty="0" smtClean="0"/>
-              <a:t>条件</a:t>
-            </a:r>
-            <a:r>
-              <a:rPr lang="zh-CN" altLang="en-US" dirty="0" smtClean="0"/>
-              <a:t>测试表达式</a:t>
+              <a:t>条件测试表达式</a:t>
             </a:r>
             <a:endParaRPr lang="en-US" dirty="0"/>
           </a:p>
@@ -18905,11 +19029,7 @@
             </a:r>
             <a:r>
               <a:rPr lang="zh-CN" altLang="en-US" dirty="0" smtClean="0"/>
-              <a:t>错</a:t>
-            </a:r>
-            <a:r>
-              <a:rPr lang="zh-CN" altLang="en-US" dirty="0" smtClean="0"/>
-              <a:t>。</a:t>
+              <a:t>错。</a:t>
             </a:r>
             <a:endParaRPr lang="en-US" altLang="zh-CN" dirty="0" smtClean="0"/>
           </a:p>
@@ -18943,11 +19063,7 @@
             </a:r>
             <a:r>
               <a:rPr lang="en-US" altLang="zh-CN" dirty="0" smtClean="0"/>
-              <a:t>e.g. </a:t>
-            </a:r>
-            <a:r>
-              <a:rPr lang="en-US" altLang="zh-CN" dirty="0" smtClean="0"/>
-              <a:t>dblbrackets.sh</a:t>
+              <a:t>e.g. dblbrackets.sh</a:t>
             </a:r>
           </a:p>
           <a:p>
@@ -19519,217 +19635,51 @@
           <a:p>
             <a:r>
               <a:rPr lang="zh-CN" altLang="en-US" dirty="0" smtClean="0"/>
-              <a:t>循环与分支表达式</a:t>
-            </a:r>
-            <a:endParaRPr lang="en-US" dirty="0"/>
+              <a:t>条件测试表达式</a:t>
+            </a:r>
+            <a:endParaRPr lang="zh-CN" altLang="en-US" dirty="0"/>
           </a:p>
         </p:txBody>
       </p:sp>
-      <p:sp>
-        <p:nvSpPr>
-          <p:cNvPr id="3" name="内容占位符 2"/>
-          <p:cNvSpPr>
-            <a:spLocks noGrp="1"/>
-          </p:cNvSpPr>
+      <p:pic>
+        <p:nvPicPr>
+          <p:cNvPr id="4" name="内容占位符 3"/>
+          <p:cNvPicPr>
+            <a:picLocks noGrp="1" noChangeAspect="1"/>
+          </p:cNvPicPr>
           <p:nvPr>
             <p:ph idx="1"/>
           </p:nvPr>
-        </p:nvSpPr>
-        <p:spPr/>
-        <p:txBody>
-          <a:bodyPr/>
-          <a:lstStyle/>
-          <a:p>
-            <a:pPr marL="0" indent="0">
-              <a:buNone/>
-            </a:pPr>
-            <a:r>
-              <a:rPr lang="zh-CN" altLang="en-US" dirty="0"/>
-              <a:t>对代码块的操作是构造和组织</a:t>
-            </a:r>
-            <a:r>
-              <a:rPr lang="en-US" altLang="zh-CN" dirty="0"/>
-              <a:t>shell</a:t>
-            </a:r>
-            <a:r>
-              <a:rPr lang="zh-CN" altLang="en-US" dirty="0"/>
-              <a:t>脚本的</a:t>
-            </a:r>
-            <a:r>
-              <a:rPr lang="zh-CN" altLang="en-US" dirty="0" smtClean="0"/>
-              <a:t>关键</a:t>
-            </a:r>
-            <a:r>
-              <a:rPr lang="zh-CN" altLang="en-US" dirty="0"/>
-              <a:t>，</a:t>
-            </a:r>
-            <a:r>
-              <a:rPr lang="zh-CN" altLang="en-US" dirty="0" smtClean="0"/>
-              <a:t>循环</a:t>
-            </a:r>
-            <a:r>
-              <a:rPr lang="zh-CN" altLang="en-US" dirty="0"/>
-              <a:t>和分支结构为脚本编程提供了操作代码块的</a:t>
-            </a:r>
-            <a:r>
-              <a:rPr lang="zh-CN" altLang="en-US" dirty="0" smtClean="0"/>
-              <a:t>工具。</a:t>
-            </a:r>
-            <a:endParaRPr lang="en-US" dirty="0"/>
-          </a:p>
-          <a:p>
-            <a:r>
-              <a:rPr lang="zh-CN" altLang="en-US" dirty="0" smtClean="0"/>
-              <a:t>循环</a:t>
-            </a:r>
-            <a:endParaRPr lang="en-US" altLang="zh-CN" dirty="0" smtClean="0"/>
-          </a:p>
-          <a:p>
-            <a:pPr marL="0" indent="0">
-              <a:buNone/>
-            </a:pPr>
-            <a:r>
-              <a:rPr lang="zh-CN" altLang="en-US" dirty="0" smtClean="0"/>
-              <a:t>循环是一个只要循环控制条件为真就一直迭代（重复）一些命令的代码块。</a:t>
-            </a:r>
-            <a:endParaRPr lang="en-US" altLang="zh-CN" dirty="0" smtClean="0"/>
-          </a:p>
-          <a:p>
-            <a:pPr>
-              <a:buFont typeface="Wingdings" panose="05000000000000000000" pitchFamily="2" charset="2"/>
-              <a:buChar char="Ø"/>
-            </a:pPr>
-            <a:r>
-              <a:rPr lang="en-US" dirty="0" smtClean="0"/>
-              <a:t>for</a:t>
-            </a:r>
-            <a:r>
-              <a:rPr lang="zh-CN" altLang="en-US" dirty="0" smtClean="0"/>
-              <a:t>循环</a:t>
-            </a:r>
-            <a:endParaRPr lang="en-US" altLang="zh-CN" dirty="0" smtClean="0"/>
-          </a:p>
-          <a:p>
-            <a:pPr marL="0" indent="0">
-              <a:buNone/>
-            </a:pPr>
-            <a:r>
-              <a:rPr lang="en-US" dirty="0"/>
-              <a:t>for </a:t>
-            </a:r>
-            <a:r>
-              <a:rPr lang="en-US" dirty="0" err="1"/>
-              <a:t>arg</a:t>
-            </a:r>
-            <a:r>
-              <a:rPr lang="en-US" dirty="0"/>
-              <a:t> in [list</a:t>
-            </a:r>
-            <a:r>
-              <a:rPr lang="en-US" dirty="0" smtClean="0"/>
-              <a:t>]</a:t>
-            </a:r>
-          </a:p>
-          <a:p>
-            <a:pPr marL="0" indent="0">
-              <a:buNone/>
-            </a:pPr>
-            <a:r>
-              <a:rPr lang="en-US" dirty="0"/>
-              <a:t>	</a:t>
-            </a:r>
-            <a:r>
-              <a:rPr lang="zh-CN" altLang="en-US" dirty="0" smtClean="0"/>
-              <a:t>这是一个基本的循环结构，与</a:t>
-            </a:r>
-            <a:r>
-              <a:rPr lang="en-US" altLang="zh-CN" dirty="0" smtClean="0"/>
-              <a:t>C</a:t>
-            </a:r>
-            <a:r>
-              <a:rPr lang="zh-CN" altLang="en-US" dirty="0" smtClean="0"/>
-              <a:t>语言中的循环结构有很大的不同。</a:t>
-            </a:r>
-            <a:endParaRPr lang="en-US" altLang="zh-CN" dirty="0" smtClean="0"/>
-          </a:p>
-          <a:p>
-            <a:pPr marL="0" indent="0">
-              <a:buNone/>
-            </a:pPr>
-            <a:r>
-              <a:rPr lang="en-US" dirty="0"/>
-              <a:t>	for </a:t>
-            </a:r>
-            <a:r>
-              <a:rPr lang="en-US" dirty="0" err="1"/>
-              <a:t>arg</a:t>
-            </a:r>
-            <a:r>
-              <a:rPr lang="en-US" dirty="0"/>
-              <a:t> in [list]</a:t>
-            </a:r>
-          </a:p>
-          <a:p>
-            <a:pPr marL="0" indent="0">
-              <a:buNone/>
-            </a:pPr>
-            <a:r>
-              <a:rPr lang="en-US" dirty="0" smtClean="0"/>
-              <a:t>	do </a:t>
-            </a:r>
-            <a:endParaRPr lang="en-US" dirty="0"/>
-          </a:p>
-          <a:p>
-            <a:pPr marL="0" indent="0">
-              <a:buNone/>
-            </a:pPr>
-            <a:r>
-              <a:rPr lang="en-US" dirty="0"/>
-              <a:t> </a:t>
-            </a:r>
-            <a:r>
-              <a:rPr lang="en-US" dirty="0" smtClean="0"/>
-              <a:t>		command(s</a:t>
-            </a:r>
-            <a:r>
-              <a:rPr lang="en-US" dirty="0"/>
-              <a:t>)... </a:t>
-            </a:r>
-          </a:p>
-          <a:p>
-            <a:pPr marL="0" indent="0">
-              <a:buNone/>
-            </a:pPr>
-            <a:r>
-              <a:rPr lang="en-US" smtClean="0"/>
-              <a:t>	done</a:t>
-            </a:r>
-          </a:p>
-          <a:p>
-            <a:pPr marL="0" indent="0">
-              <a:buNone/>
-            </a:pPr>
-            <a:endParaRPr lang="en-US" dirty="0"/>
-          </a:p>
-        </p:txBody>
-      </p:sp>
+        </p:nvPicPr>
+        <p:blipFill>
+          <a:blip r:embed="rId2">
+            <a:extLst>
+              <a:ext uri="{28A0092B-C50C-407E-A947-70E740481C1C}">
+                <a14:useLocalDpi xmlns:a14="http://schemas.microsoft.com/office/drawing/2010/main" val="0"/>
+              </a:ext>
+            </a:extLst>
+          </a:blip>
+          <a:stretch>
+            <a:fillRect/>
+          </a:stretch>
+        </p:blipFill>
+        <p:spPr>
+          <a:xfrm>
+            <a:off x="3119483" y="1651000"/>
+            <a:ext cx="7854859" cy="4260850"/>
+          </a:xfrm>
+        </p:spPr>
+      </p:pic>
     </p:spTree>
     <p:extLst>
       <p:ext uri="{BB962C8B-B14F-4D97-AF65-F5344CB8AC3E}">
-        <p14:creationId xmlns:p14="http://schemas.microsoft.com/office/powerpoint/2010/main" val="232427816"/>
+        <p14:creationId xmlns:p14="http://schemas.microsoft.com/office/powerpoint/2010/main" val="740701836"/>
       </p:ext>
     </p:extLst>
   </p:cSld>
   <p:clrMapOvr>
     <a:masterClrMapping/>
   </p:clrMapOvr>
-  <p:timing>
-    <p:tnLst>
-      <p:par>
-        <p:cTn id="1" dur="indefinite" restart="never" nodeType="tmRoot"/>
-      </p:par>
-    </p:tnLst>
-  </p:timing>
 </p:sld>
 </file>
 
@@ -19906,93 +19856,51 @@
           <a:lstStyle/>
           <a:p>
             <a:r>
-              <a:rPr lang="zh-CN" altLang="en-US" dirty="0" smtClean="0"/>
-              <a:t>实用工具</a:t>
-            </a:r>
-            <a:endParaRPr lang="zh-CN" altLang="en-US" dirty="0"/>
+              <a:rPr lang="zh-CN" altLang="en-US" dirty="0"/>
+              <a:t>条件测试表达式</a:t>
+            </a:r>
           </a:p>
         </p:txBody>
       </p:sp>
-      <p:sp>
-        <p:nvSpPr>
-          <p:cNvPr id="3" name="内容占位符 2"/>
-          <p:cNvSpPr>
-            <a:spLocks noGrp="1"/>
-          </p:cNvSpPr>
+      <p:pic>
+        <p:nvPicPr>
+          <p:cNvPr id="4" name="内容占位符 3"/>
+          <p:cNvPicPr>
+            <a:picLocks noGrp="1" noChangeAspect="1"/>
+          </p:cNvPicPr>
           <p:nvPr>
             <p:ph idx="1"/>
           </p:nvPr>
-        </p:nvSpPr>
-        <p:spPr/>
-        <p:txBody>
-          <a:bodyPr/>
-          <a:lstStyle/>
-          <a:p>
-            <a:r>
-              <a:rPr lang="en-US" altLang="zh-CN" dirty="0" smtClean="0"/>
-              <a:t>cut </a:t>
-            </a:r>
-            <a:r>
-              <a:rPr lang="zh-CN" altLang="en-US" dirty="0" smtClean="0"/>
-              <a:t>的用法</a:t>
-            </a:r>
-            <a:endParaRPr lang="en-US" altLang="zh-CN" dirty="0"/>
-          </a:p>
-          <a:p>
-            <a:r>
-              <a:rPr lang="en-US" altLang="zh-CN" dirty="0" smtClean="0"/>
-              <a:t>grep </a:t>
-            </a:r>
-            <a:r>
-              <a:rPr lang="zh-CN" altLang="en-US" dirty="0" smtClean="0"/>
-              <a:t>的用法</a:t>
-            </a:r>
-            <a:endParaRPr lang="en-US" altLang="zh-CN" dirty="0" smtClean="0"/>
-          </a:p>
-          <a:p>
-            <a:r>
-              <a:rPr lang="en-US" altLang="zh-CN" dirty="0" smtClean="0"/>
-              <a:t>sed </a:t>
-            </a:r>
-            <a:r>
-              <a:rPr lang="zh-CN" altLang="en-US" dirty="0" smtClean="0"/>
-              <a:t>的用法</a:t>
-            </a:r>
-            <a:endParaRPr lang="en-US" altLang="zh-CN" dirty="0" smtClean="0"/>
-          </a:p>
-          <a:p>
-            <a:r>
-              <a:rPr lang="en-US" altLang="zh-CN" dirty="0" smtClean="0"/>
-              <a:t>awk </a:t>
-            </a:r>
-            <a:r>
-              <a:rPr lang="zh-CN" altLang="en-US" dirty="0" smtClean="0"/>
-              <a:t>的用法</a:t>
-            </a:r>
-            <a:endParaRPr lang="en-US" altLang="zh-CN" dirty="0" smtClean="0"/>
-          </a:p>
-          <a:p>
-            <a:endParaRPr lang="zh-CN" altLang="en-US" dirty="0"/>
-          </a:p>
-        </p:txBody>
-      </p:sp>
+        </p:nvPicPr>
+        <p:blipFill>
+          <a:blip r:embed="rId2">
+            <a:extLst>
+              <a:ext uri="{28A0092B-C50C-407E-A947-70E740481C1C}">
+                <a14:useLocalDpi xmlns:a14="http://schemas.microsoft.com/office/drawing/2010/main" val="0"/>
+              </a:ext>
+            </a:extLst>
+          </a:blip>
+          <a:stretch>
+            <a:fillRect/>
+          </a:stretch>
+        </p:blipFill>
+        <p:spPr>
+          <a:xfrm>
+            <a:off x="3514027" y="1651000"/>
+            <a:ext cx="7065771" cy="4260850"/>
+          </a:xfrm>
+        </p:spPr>
+      </p:pic>
     </p:spTree>
     <p:extLst>
       <p:ext uri="{BB962C8B-B14F-4D97-AF65-F5344CB8AC3E}">
-        <p14:creationId xmlns:p14="http://schemas.microsoft.com/office/powerpoint/2010/main" val="2492421797"/>
+        <p14:creationId xmlns:p14="http://schemas.microsoft.com/office/powerpoint/2010/main" val="1594783850"/>
       </p:ext>
     </p:extLst>
   </p:cSld>
   <p:clrMapOvr>
     <a:masterClrMapping/>
   </p:clrMapOvr>
-  <p:timing>
-    <p:tnLst>
-      <p:par>
-        <p:cTn id="1" dur="indefinite" restart="never" nodeType="tmRoot"/>
-      </p:par>
-    </p:tnLst>
-  </p:timing>
 </p:sld>
 </file>
 
@@ -20030,8 +19938,306 @@
           <a:p>
             <a:r>
               <a:rPr lang="zh-CN" altLang="en-US" dirty="0"/>
-              <a:t>参考</a:t>
-            </a:r>
+              <a:t>循环与分支表达式</a:t>
+            </a:r>
+          </a:p>
+        </p:txBody>
+      </p:sp>
+      <p:sp>
+        <p:nvSpPr>
+          <p:cNvPr id="3" name="内容占位符 2"/>
+          <p:cNvSpPr>
+            <a:spLocks noGrp="1"/>
+          </p:cNvSpPr>
+          <p:nvPr>
+            <p:ph idx="1"/>
+          </p:nvPr>
+        </p:nvSpPr>
+        <p:spPr/>
+        <p:txBody>
+          <a:bodyPr>
+            <a:normAutofit fontScale="92500" lnSpcReduction="20000"/>
+          </a:bodyPr>
+          <a:lstStyle/>
+          <a:p>
+            <a:pPr marL="0" indent="0">
+              <a:buNone/>
+            </a:pPr>
+            <a:r>
+              <a:rPr lang="zh-CN" altLang="en-US" dirty="0"/>
+              <a:t>对代码块的操作是构造和组织</a:t>
+            </a:r>
+            <a:r>
+              <a:rPr lang="en-US" altLang="zh-CN" dirty="0"/>
+              <a:t>shell</a:t>
+            </a:r>
+            <a:r>
+              <a:rPr lang="zh-CN" altLang="en-US" dirty="0"/>
+              <a:t>脚本的关键，循环和分支结构为脚本编程提供了操作代码块的工具</a:t>
+            </a:r>
+            <a:r>
+              <a:rPr lang="zh-CN" altLang="en-US" dirty="0" smtClean="0"/>
+              <a:t>。</a:t>
+            </a:r>
+            <a:endParaRPr lang="en-US" altLang="zh-CN" dirty="0" smtClean="0"/>
+          </a:p>
+          <a:p>
+            <a:r>
+              <a:rPr lang="zh-CN" altLang="en-US" dirty="0" smtClean="0"/>
+              <a:t>循环</a:t>
+            </a:r>
+            <a:endParaRPr lang="en-US" altLang="zh-CN" dirty="0" smtClean="0"/>
+          </a:p>
+          <a:p>
+            <a:pPr marL="0" indent="0">
+              <a:buNone/>
+            </a:pPr>
+            <a:r>
+              <a:rPr lang="zh-CN" altLang="en-US" dirty="0" smtClean="0"/>
+              <a:t>只要循环控制条件为</a:t>
+            </a:r>
+            <a:r>
+              <a:rPr lang="en-US" altLang="zh-CN" dirty="0" smtClean="0"/>
+              <a:t>true</a:t>
+            </a:r>
+            <a:r>
+              <a:rPr lang="zh-CN" altLang="en-US" dirty="0" smtClean="0"/>
+              <a:t>（真），迭代（重复 ）命令列表的代码块。</a:t>
+            </a:r>
+            <a:endParaRPr lang="en-US" altLang="zh-CN" dirty="0" smtClean="0"/>
+          </a:p>
+          <a:p>
+            <a:pPr>
+              <a:buFont typeface="Wingdings" panose="05000000000000000000" pitchFamily="2" charset="2"/>
+              <a:buChar char="Ø"/>
+            </a:pPr>
+            <a:r>
+              <a:rPr lang="en-US" altLang="zh-CN" dirty="0" smtClean="0"/>
+              <a:t>for </a:t>
+            </a:r>
+            <a:r>
+              <a:rPr lang="zh-CN" altLang="en-US" dirty="0" smtClean="0"/>
+              <a:t>循环</a:t>
+            </a:r>
+            <a:endParaRPr lang="en-US" altLang="zh-CN" dirty="0" smtClean="0"/>
+          </a:p>
+          <a:p>
+            <a:pPr>
+              <a:buFont typeface="Wingdings" panose="05000000000000000000" pitchFamily="2" charset="2"/>
+              <a:buChar char="Ø"/>
+            </a:pPr>
+            <a:r>
+              <a:rPr lang="en-US" altLang="zh-CN" dirty="0" smtClean="0"/>
+              <a:t>while </a:t>
+            </a:r>
+            <a:r>
+              <a:rPr lang="zh-CN" altLang="en-US" dirty="0" smtClean="0"/>
+              <a:t>循环</a:t>
+            </a:r>
+            <a:endParaRPr lang="en-US" altLang="zh-CN" dirty="0" smtClean="0"/>
+          </a:p>
+          <a:p>
+            <a:pPr>
+              <a:buFont typeface="Wingdings" panose="05000000000000000000" pitchFamily="2" charset="2"/>
+              <a:buChar char="Ø"/>
+            </a:pPr>
+            <a:r>
+              <a:rPr lang="en-US" altLang="zh-CN" dirty="0" smtClean="0"/>
+              <a:t>until </a:t>
+            </a:r>
+            <a:r>
+              <a:rPr lang="zh-CN" altLang="en-US" dirty="0" smtClean="0"/>
+              <a:t>循环</a:t>
+            </a:r>
+            <a:endParaRPr lang="en-US" altLang="zh-CN" dirty="0" smtClean="0"/>
+          </a:p>
+          <a:p>
+            <a:pPr>
+              <a:buFont typeface="Wingdings" panose="05000000000000000000" pitchFamily="2" charset="2"/>
+              <a:buChar char="Ø"/>
+            </a:pPr>
+            <a:r>
+              <a:rPr lang="zh-CN" altLang="en-US" dirty="0" smtClean="0"/>
+              <a:t>嵌套循环与循环控制</a:t>
+            </a:r>
+            <a:endParaRPr lang="en-US" altLang="zh-CN" dirty="0"/>
+          </a:p>
+          <a:p>
+            <a:r>
+              <a:rPr lang="zh-CN" altLang="en-US" dirty="0" smtClean="0"/>
+              <a:t>测试与分支</a:t>
+            </a:r>
+            <a:endParaRPr lang="en-US" altLang="zh-CN" dirty="0" smtClean="0"/>
+          </a:p>
+          <a:p>
+            <a:pPr marL="0" indent="0">
+              <a:buNone/>
+            </a:pPr>
+            <a:r>
+              <a:rPr lang="en-US" altLang="zh-CN" dirty="0"/>
+              <a:t>case</a:t>
+            </a:r>
+            <a:r>
+              <a:rPr lang="zh-CN" altLang="en-US" dirty="0"/>
+              <a:t>和</a:t>
+            </a:r>
+            <a:r>
+              <a:rPr lang="en-US" altLang="zh-CN" dirty="0"/>
+              <a:t>select</a:t>
+            </a:r>
+            <a:r>
+              <a:rPr lang="zh-CN" altLang="en-US" dirty="0"/>
+              <a:t>结构在技术上说并不是</a:t>
+            </a:r>
+            <a:r>
+              <a:rPr lang="zh-CN" altLang="en-US" dirty="0" smtClean="0"/>
+              <a:t>循环</a:t>
+            </a:r>
+            <a:r>
+              <a:rPr lang="zh-CN" altLang="en-US" dirty="0"/>
+              <a:t>，</a:t>
+            </a:r>
+            <a:r>
+              <a:rPr lang="zh-CN" altLang="en-US" dirty="0" smtClean="0"/>
+              <a:t>因为</a:t>
+            </a:r>
+            <a:r>
+              <a:rPr lang="zh-CN" altLang="en-US" dirty="0"/>
+              <a:t>它们并不对可执行代码块进行</a:t>
+            </a:r>
+            <a:r>
+              <a:rPr lang="zh-CN" altLang="en-US" dirty="0" smtClean="0"/>
+              <a:t>迭代</a:t>
+            </a:r>
+            <a:r>
+              <a:rPr lang="zh-CN" altLang="en-US" dirty="0"/>
+              <a:t>。</a:t>
+            </a:r>
+            <a:r>
+              <a:rPr lang="zh-CN" altLang="en-US" dirty="0" smtClean="0"/>
+              <a:t>但是</a:t>
+            </a:r>
+            <a:r>
+              <a:rPr lang="zh-CN" altLang="en-US" dirty="0"/>
+              <a:t>和循环相似的</a:t>
+            </a:r>
+            <a:r>
+              <a:rPr lang="zh-CN" altLang="en-US" dirty="0" smtClean="0"/>
+              <a:t>是</a:t>
+            </a:r>
+            <a:r>
+              <a:rPr lang="zh-CN" altLang="en-US" dirty="0"/>
+              <a:t>，</a:t>
+            </a:r>
+            <a:r>
+              <a:rPr lang="zh-CN" altLang="en-US" dirty="0" smtClean="0"/>
+              <a:t>它们</a:t>
+            </a:r>
+            <a:r>
+              <a:rPr lang="zh-CN" altLang="en-US" dirty="0"/>
+              <a:t>也依靠在代码块顶部或底部的条件判断来决定程序的</a:t>
+            </a:r>
+            <a:r>
+              <a:rPr lang="zh-CN" altLang="en-US" dirty="0" smtClean="0"/>
+              <a:t>分支。</a:t>
+            </a:r>
+            <a:endParaRPr lang="en-US" altLang="zh-CN" dirty="0" smtClean="0"/>
+          </a:p>
+          <a:p>
+            <a:pPr>
+              <a:buFont typeface="Wingdings" panose="05000000000000000000" pitchFamily="2" charset="2"/>
+              <a:buChar char="Ø"/>
+            </a:pPr>
+            <a:r>
+              <a:rPr lang="en-US" altLang="zh-CN" dirty="0" smtClean="0"/>
+              <a:t>case </a:t>
+            </a:r>
+            <a:r>
+              <a:rPr lang="zh-CN" altLang="en-US" dirty="0" smtClean="0"/>
+              <a:t>语句</a:t>
+            </a:r>
+            <a:endParaRPr lang="en-US" altLang="zh-CN" dirty="0" smtClean="0"/>
+          </a:p>
+          <a:p>
+            <a:pPr>
+              <a:buFont typeface="Wingdings" panose="05000000000000000000" pitchFamily="2" charset="2"/>
+              <a:buChar char="Ø"/>
+            </a:pPr>
+            <a:r>
+              <a:rPr lang="en-US" altLang="zh-CN" dirty="0" smtClean="0"/>
+              <a:t>select </a:t>
+            </a:r>
+            <a:r>
+              <a:rPr lang="zh-CN" altLang="en-US" dirty="0" smtClean="0"/>
+              <a:t>语句</a:t>
+            </a:r>
+            <a:endParaRPr lang="en-US" altLang="zh-CN" dirty="0"/>
+          </a:p>
+          <a:p>
+            <a:endParaRPr lang="en-US" altLang="zh-CN" dirty="0" smtClean="0"/>
+          </a:p>
+          <a:p>
+            <a:endParaRPr lang="en-US" altLang="zh-CN" dirty="0" smtClean="0"/>
+          </a:p>
+          <a:p>
+            <a:endParaRPr lang="zh-CN" altLang="en-US" dirty="0"/>
+          </a:p>
+        </p:txBody>
+      </p:sp>
+    </p:spTree>
+    <p:extLst>
+      <p:ext uri="{BB962C8B-B14F-4D97-AF65-F5344CB8AC3E}">
+        <p14:creationId xmlns:p14="http://schemas.microsoft.com/office/powerpoint/2010/main" val="3170182233"/>
+      </p:ext>
+    </p:extLst>
+  </p:cSld>
+  <p:clrMapOvr>
+    <a:masterClrMapping/>
+  </p:clrMapOvr>
+</p:sld>
+</file>
+
+<file path=ppt/slides/slide52.xml><?xml version="1.0" encoding="utf-8"?>
+<p:sld xmlns:a="http://schemas.openxmlformats.org/drawingml/2006/main" xmlns:r="http://schemas.openxmlformats.org/officeDocument/2006/relationships" xmlns:p="http://schemas.openxmlformats.org/presentationml/2006/main">
+  <p:cSld>
+    <p:spTree>
+      <p:nvGrpSpPr>
+        <p:cNvPr id="1" name=""/>
+        <p:cNvGrpSpPr/>
+        <p:nvPr/>
+      </p:nvGrpSpPr>
+      <p:grpSpPr>
+        <a:xfrm>
+          <a:off x="0" y="0"/>
+          <a:ext cx="0" cy="0"/>
+          <a:chOff x="0" y="0"/>
+          <a:chExt cx="0" cy="0"/>
+        </a:xfrm>
+      </p:grpSpPr>
+      <p:sp>
+        <p:nvSpPr>
+          <p:cNvPr id="2" name="标题 1"/>
+          <p:cNvSpPr>
+            <a:spLocks noGrp="1"/>
+          </p:cNvSpPr>
+          <p:nvPr>
+            <p:ph type="title"/>
+          </p:nvPr>
+        </p:nvSpPr>
+        <p:spPr/>
+        <p:txBody>
+          <a:bodyPr/>
+          <a:lstStyle/>
+          <a:p>
+            <a:r>
+              <a:rPr lang="en-US" altLang="zh-CN" dirty="0" smtClean="0"/>
+              <a:t>for </a:t>
+            </a:r>
+            <a:r>
+              <a:rPr lang="zh-CN" altLang="en-US" dirty="0" smtClean="0"/>
+              <a:t>循环</a:t>
+            </a:r>
+            <a:endParaRPr lang="en-US" dirty="0"/>
           </a:p>
         </p:txBody>
       </p:sp>
@@ -20052,17 +20258,45 @@
           </a:bodyPr>
           <a:lstStyle/>
           <a:p>
-            <a:r>
-              <a:rPr lang="en-US" altLang="zh-CN" dirty="0" smtClean="0"/>
-              <a:t>Advanced </a:t>
-            </a:r>
-            <a:r>
-              <a:rPr lang="en-US" altLang="zh-CN" dirty="0"/>
-              <a:t>Bash-Scripting Guide</a:t>
-            </a:r>
-            <a:r>
-              <a:rPr lang="zh-CN" altLang="en-US" dirty="0" smtClean="0"/>
-              <a:t>：</a:t>
+            <a:pPr marL="0" indent="0">
+              <a:buNone/>
+            </a:pPr>
+            <a:r>
+              <a:rPr lang="en-US" dirty="0" smtClean="0"/>
+              <a:t>for </a:t>
+            </a:r>
+            <a:r>
+              <a:rPr lang="en-US" dirty="0" err="1"/>
+              <a:t>arg</a:t>
+            </a:r>
+            <a:r>
+              <a:rPr lang="en-US" dirty="0"/>
+              <a:t> in [list</a:t>
+            </a:r>
+            <a:r>
+              <a:rPr lang="en-US" dirty="0" smtClean="0"/>
+              <a:t>]</a:t>
+            </a:r>
+          </a:p>
+          <a:p>
+            <a:pPr marL="0" indent="0">
+              <a:buNone/>
+            </a:pPr>
+            <a:r>
+              <a:rPr lang="zh-CN" altLang="en-US" dirty="0" smtClean="0"/>
+              <a:t>这</a:t>
+            </a:r>
+            <a:r>
+              <a:rPr lang="zh-CN" altLang="en-US" dirty="0" smtClean="0"/>
+              <a:t>是一个基本的循环结构，与</a:t>
+            </a:r>
+            <a:r>
+              <a:rPr lang="en-US" altLang="zh-CN" dirty="0" smtClean="0"/>
+              <a:t>C</a:t>
+            </a:r>
+            <a:r>
+              <a:rPr lang="zh-CN" altLang="en-US" dirty="0" smtClean="0"/>
+              <a:t>语言中的循环结构有很大的不同。</a:t>
             </a:r>
             <a:endParaRPr lang="en-US" altLang="zh-CN" dirty="0" smtClean="0"/>
           </a:p>
@@ -20071,25 +20305,134 @@
               <a:buNone/>
             </a:pPr>
             <a:r>
-              <a:rPr lang="en-US" altLang="zh-CN" dirty="0" smtClean="0">
-                <a:hlinkClick r:id="rId2"/>
-              </a:rPr>
-              <a:t>http://www.tldp.org/LDP/abs/html/abs-guide.html</a:t>
-            </a:r>
-            <a:endParaRPr lang="en-US" altLang="zh-CN" dirty="0"/>
-          </a:p>
-          <a:p>
-            <a:r>
-              <a:rPr lang="en-US" altLang="zh-CN" dirty="0" smtClean="0"/>
-              <a:t>sed </a:t>
-            </a:r>
-            <a:r>
-              <a:rPr lang="en-US" altLang="zh-CN" dirty="0"/>
-              <a:t>&amp; awk </a:t>
-            </a:r>
-            <a:r>
-              <a:rPr lang="zh-CN" altLang="en-US" dirty="0" smtClean="0"/>
-              <a:t>概述</a:t>
+              <a:rPr lang="en-US" dirty="0" smtClean="0"/>
+              <a:t>for </a:t>
+            </a:r>
+            <a:r>
+              <a:rPr lang="en-US" dirty="0" err="1"/>
+              <a:t>arg</a:t>
+            </a:r>
+            <a:r>
+              <a:rPr lang="en-US" dirty="0"/>
+              <a:t> in [list]</a:t>
+            </a:r>
+          </a:p>
+          <a:p>
+            <a:pPr marL="0" indent="0">
+              <a:buNone/>
+            </a:pPr>
+            <a:r>
+              <a:rPr lang="en-US" dirty="0" smtClean="0"/>
+              <a:t>do </a:t>
+            </a:r>
+            <a:endParaRPr lang="en-US" dirty="0"/>
+          </a:p>
+          <a:p>
+            <a:pPr marL="0" indent="0">
+              <a:buNone/>
+            </a:pPr>
+            <a:r>
+              <a:rPr lang="en-US" dirty="0"/>
+              <a:t> </a:t>
+            </a:r>
+            <a:r>
+              <a:rPr lang="en-US" dirty="0" smtClean="0"/>
+              <a:t>	</a:t>
+            </a:r>
+            <a:r>
+              <a:rPr lang="en-US" dirty="0" smtClean="0"/>
+              <a:t>command(s</a:t>
+            </a:r>
+            <a:r>
+              <a:rPr lang="en-US" dirty="0"/>
+              <a:t>)... </a:t>
+            </a:r>
+          </a:p>
+          <a:p>
+            <a:pPr marL="0" indent="0">
+              <a:buNone/>
+            </a:pPr>
+            <a:r>
+              <a:rPr lang="en-US" dirty="0" smtClean="0"/>
+              <a:t>done</a:t>
+            </a:r>
+          </a:p>
+          <a:p>
+            <a:pPr marL="0" indent="0">
+              <a:buNone/>
+            </a:pPr>
+            <a:r>
+              <a:rPr lang="zh-CN" altLang="en-US" dirty="0" smtClean="0"/>
+              <a:t>在循环的每次执行中，</a:t>
+            </a:r>
+            <a:r>
+              <a:rPr lang="en-US" altLang="zh-CN" dirty="0" err="1" smtClean="0"/>
+              <a:t>arg</a:t>
+            </a:r>
+            <a:r>
+              <a:rPr lang="zh-CN" altLang="en-US" dirty="0" smtClean="0"/>
+              <a:t>将顺序的访问</a:t>
+            </a:r>
+            <a:r>
+              <a:rPr lang="en-US" altLang="zh-CN" dirty="0" smtClean="0"/>
+              <a:t>list</a:t>
+            </a:r>
+            <a:r>
+              <a:rPr lang="zh-CN" altLang="en-US" dirty="0" smtClean="0"/>
+              <a:t>中列出的变量。</a:t>
+            </a:r>
+            <a:r>
+              <a:rPr lang="en-US" altLang="zh-CN" dirty="0" smtClean="0"/>
+              <a:t>e.g. for-loop.sh</a:t>
+            </a:r>
+          </a:p>
+          <a:p>
+            <a:pPr marL="0" indent="0">
+              <a:buNone/>
+            </a:pPr>
+            <a:r>
+              <a:rPr lang="en-US" dirty="0" smtClean="0"/>
+              <a:t>list </a:t>
+            </a:r>
+            <a:r>
+              <a:rPr lang="zh-CN" altLang="en-US" dirty="0" smtClean="0"/>
+              <a:t>中的参数允许包含通配符</a:t>
+            </a:r>
+            <a:r>
+              <a:rPr lang="zh-CN" altLang="en-US" dirty="0" smtClean="0"/>
+              <a:t>。如果</a:t>
+            </a:r>
+            <a:r>
+              <a:rPr lang="en-US" altLang="zh-CN" dirty="0" smtClean="0"/>
+              <a:t>do</a:t>
+            </a:r>
+            <a:r>
+              <a:rPr lang="zh-CN" altLang="en-US" dirty="0" smtClean="0"/>
+              <a:t>和</a:t>
+            </a:r>
+            <a:r>
+              <a:rPr lang="en-US" altLang="zh-CN" dirty="0" smtClean="0"/>
+              <a:t>for</a:t>
+            </a:r>
+            <a:r>
+              <a:rPr lang="zh-CN" altLang="en-US" dirty="0" smtClean="0"/>
+              <a:t>在同一行，则需要在</a:t>
+            </a:r>
+            <a:r>
+              <a:rPr lang="en-US" altLang="zh-CN" dirty="0" smtClean="0"/>
+              <a:t>list</a:t>
+            </a:r>
+            <a:r>
+              <a:rPr lang="zh-CN" altLang="en-US" dirty="0" smtClean="0"/>
+              <a:t>后面添加一个</a:t>
+            </a:r>
+            <a:r>
+              <a:rPr lang="en-US" altLang="zh-CN" dirty="0" smtClean="0"/>
+              <a:t>;</a:t>
+            </a:r>
+            <a:r>
+              <a:rPr lang="zh-CN" altLang="en-US" dirty="0" smtClean="0"/>
+              <a:t>号</a:t>
             </a:r>
             <a:endParaRPr lang="en-US" altLang="zh-CN" dirty="0" smtClean="0"/>
           </a:p>
@@ -20098,91 +20441,25 @@
               <a:buNone/>
             </a:pPr>
             <a:r>
-              <a:rPr lang="en-US" altLang="zh-CN" dirty="0" smtClean="0">
-                <a:hlinkClick r:id="rId3"/>
-              </a:rPr>
-              <a:t>http://jarson.in/sed-awk-overview/</a:t>
-            </a:r>
-            <a:endParaRPr lang="en-US" altLang="zh-CN" dirty="0" smtClean="0"/>
-          </a:p>
-          <a:p>
-            <a:r>
-              <a:rPr lang="en-US" altLang="zh-CN" dirty="0" smtClean="0"/>
-              <a:t>sed </a:t>
-            </a:r>
-            <a:r>
-              <a:rPr lang="zh-CN" altLang="en-US" dirty="0"/>
-              <a:t>学习</a:t>
-            </a:r>
-            <a:r>
-              <a:rPr lang="zh-CN" altLang="en-US" dirty="0" smtClean="0"/>
-              <a:t>手册</a:t>
-            </a:r>
-            <a:endParaRPr lang="en-US" altLang="zh-CN" dirty="0" smtClean="0"/>
-          </a:p>
-          <a:p>
-            <a:pPr marL="0" indent="0">
-              <a:buNone/>
-            </a:pPr>
-            <a:r>
-              <a:rPr lang="en-US" altLang="zh-CN" dirty="0" smtClean="0">
-                <a:hlinkClick r:id="rId4"/>
-              </a:rPr>
-              <a:t>http://jarson.in/sed-manual/</a:t>
-            </a:r>
-            <a:endParaRPr lang="en-US" altLang="zh-CN" dirty="0" smtClean="0"/>
-          </a:p>
-          <a:p>
-            <a:r>
-              <a:rPr lang="en-US" altLang="zh-CN" dirty="0" smtClean="0"/>
-              <a:t>sed </a:t>
-            </a:r>
-            <a:r>
-              <a:rPr lang="zh-CN" altLang="en-US" dirty="0"/>
-              <a:t>函数</a:t>
-            </a:r>
-            <a:r>
-              <a:rPr lang="zh-CN" altLang="en-US" dirty="0" smtClean="0"/>
-              <a:t>参数</a:t>
-            </a:r>
-            <a:endParaRPr lang="en-US" altLang="zh-CN" dirty="0" smtClean="0"/>
-          </a:p>
-          <a:p>
-            <a:pPr marL="0" indent="0">
-              <a:buNone/>
-            </a:pPr>
-            <a:r>
-              <a:rPr lang="en-US" altLang="zh-CN" dirty="0" smtClean="0">
-                <a:hlinkClick r:id="rId5"/>
-              </a:rPr>
-              <a:t>http://jarson.in/sed-functions/</a:t>
-            </a:r>
-            <a:endParaRPr lang="en-US" altLang="zh-CN" dirty="0"/>
-          </a:p>
-          <a:p>
-            <a:r>
-              <a:rPr lang="en-US" altLang="zh-CN" dirty="0" smtClean="0"/>
-              <a:t>awk</a:t>
-            </a:r>
-          </a:p>
-          <a:p>
-            <a:pPr marL="0" indent="0">
-              <a:buNone/>
-            </a:pPr>
-            <a:r>
-              <a:rPr lang="en-US" altLang="zh-CN" dirty="0" smtClean="0">
-                <a:hlinkClick r:id="rId6"/>
-              </a:rPr>
-              <a:t>http://www.aslibra.com/doc/awk.htm</a:t>
-            </a:r>
-            <a:endParaRPr lang="zh-CN" altLang="en-US" dirty="0"/>
+              <a:rPr lang="en-US" dirty="0" smtClean="0"/>
+              <a:t>for </a:t>
+            </a:r>
+            <a:r>
+              <a:rPr lang="en-US" dirty="0" err="1" smtClean="0"/>
+              <a:t>arg</a:t>
+            </a:r>
+            <a:r>
+              <a:rPr lang="en-US" dirty="0" smtClean="0"/>
+              <a:t> in [list] ; do</a:t>
+            </a:r>
+            <a:endParaRPr lang="en-US" dirty="0" smtClean="0"/>
           </a:p>
         </p:txBody>
       </p:sp>
     </p:spTree>
     <p:extLst>
       <p:ext uri="{BB962C8B-B14F-4D97-AF65-F5344CB8AC3E}">
-        <p14:creationId xmlns:p14="http://schemas.microsoft.com/office/powerpoint/2010/main" val="893627498"/>
+        <p14:creationId xmlns:p14="http://schemas.microsoft.com/office/powerpoint/2010/main" val="232427816"/>
       </p:ext>
     </p:extLst>
   </p:cSld>
@@ -20196,6 +20473,1956 @@
       </p:par>
     </p:tnLst>
   </p:timing>
+</p:sld>
+</file>
+
+<file path=ppt/slides/slide53.xml><?xml version="1.0" encoding="utf-8"?>
+<p:sld xmlns:a="http://schemas.openxmlformats.org/drawingml/2006/main" xmlns:r="http://schemas.openxmlformats.org/officeDocument/2006/relationships" xmlns:p="http://schemas.openxmlformats.org/presentationml/2006/main">
+  <p:cSld>
+    <p:spTree>
+      <p:nvGrpSpPr>
+        <p:cNvPr id="1" name=""/>
+        <p:cNvGrpSpPr/>
+        <p:nvPr/>
+      </p:nvGrpSpPr>
+      <p:grpSpPr>
+        <a:xfrm>
+          <a:off x="0" y="0"/>
+          <a:ext cx="0" cy="0"/>
+          <a:chOff x="0" y="0"/>
+          <a:chExt cx="0" cy="0"/>
+        </a:xfrm>
+      </p:grpSpPr>
+      <p:sp>
+        <p:nvSpPr>
+          <p:cNvPr id="2" name="标题 1"/>
+          <p:cNvSpPr>
+            <a:spLocks noGrp="1"/>
+          </p:cNvSpPr>
+          <p:nvPr>
+            <p:ph type="title"/>
+          </p:nvPr>
+        </p:nvSpPr>
+        <p:spPr/>
+        <p:txBody>
+          <a:bodyPr/>
+          <a:lstStyle/>
+          <a:p>
+            <a:r>
+              <a:rPr lang="en-US" altLang="zh-CN" dirty="0" smtClean="0"/>
+              <a:t>for </a:t>
+            </a:r>
+            <a:r>
+              <a:rPr lang="zh-CN" altLang="en-US" dirty="0" smtClean="0"/>
+              <a:t>循环</a:t>
+            </a:r>
+            <a:endParaRPr lang="zh-CN" altLang="en-US" dirty="0"/>
+          </a:p>
+        </p:txBody>
+      </p:sp>
+      <p:sp>
+        <p:nvSpPr>
+          <p:cNvPr id="3" name="内容占位符 2"/>
+          <p:cNvSpPr>
+            <a:spLocks noGrp="1"/>
+          </p:cNvSpPr>
+          <p:nvPr>
+            <p:ph idx="1"/>
+          </p:nvPr>
+        </p:nvSpPr>
+        <p:spPr/>
+        <p:txBody>
+          <a:bodyPr/>
+          <a:lstStyle/>
+          <a:p>
+            <a:r>
+              <a:rPr lang="zh-CN" altLang="en-US" dirty="0" smtClean="0"/>
+              <a:t>简单的</a:t>
+            </a:r>
+            <a:r>
+              <a:rPr lang="en-US" altLang="zh-CN" dirty="0" smtClean="0"/>
+              <a:t>for</a:t>
+            </a:r>
+            <a:r>
+              <a:rPr lang="zh-CN" altLang="en-US" dirty="0" smtClean="0"/>
+              <a:t>循环。</a:t>
+            </a:r>
+            <a:r>
+              <a:rPr lang="en-US" altLang="zh-CN" dirty="0" smtClean="0"/>
+              <a:t>e.g</a:t>
+            </a:r>
+            <a:r>
+              <a:rPr lang="en-US" altLang="zh-CN" dirty="0"/>
+              <a:t>. </a:t>
+            </a:r>
+            <a:r>
+              <a:rPr lang="en-US" altLang="zh-CN" dirty="0" smtClean="0"/>
+              <a:t>simple-for-loop.sh</a:t>
+            </a:r>
+          </a:p>
+          <a:p>
+            <a:r>
+              <a:rPr lang="en-US" altLang="zh-CN" dirty="0" smtClean="0"/>
+              <a:t>for</a:t>
+            </a:r>
+            <a:r>
+              <a:rPr lang="zh-CN" altLang="en-US" dirty="0" smtClean="0"/>
+              <a:t>循环中的</a:t>
+            </a:r>
+            <a:r>
+              <a:rPr lang="en-US" altLang="zh-CN" dirty="0" smtClean="0"/>
+              <a:t>[list]</a:t>
+            </a:r>
+            <a:r>
+              <a:rPr lang="zh-CN" altLang="en-US" dirty="0" smtClean="0"/>
+              <a:t>可以被参数化</a:t>
+            </a:r>
+            <a:r>
+              <a:rPr lang="zh-CN" altLang="en-US" dirty="0"/>
+              <a:t>。</a:t>
+            </a:r>
+            <a:r>
+              <a:rPr lang="en-US" altLang="zh-CN" dirty="0" smtClean="0"/>
+              <a:t>e.g. fileinfo.sh</a:t>
+            </a:r>
+          </a:p>
+          <a:p>
+            <a:r>
+              <a:rPr lang="zh-CN" altLang="en-US" dirty="0" smtClean="0"/>
+              <a:t>如果</a:t>
+            </a:r>
+            <a:r>
+              <a:rPr lang="en-US" altLang="zh-CN" dirty="0" smtClean="0"/>
+              <a:t>for</a:t>
+            </a:r>
+            <a:r>
+              <a:rPr lang="zh-CN" altLang="en-US" dirty="0" smtClean="0"/>
+              <a:t>循环中的</a:t>
+            </a:r>
+            <a:r>
+              <a:rPr lang="en-US" altLang="zh-CN" dirty="0" smtClean="0"/>
+              <a:t>[list]</a:t>
+            </a:r>
+            <a:r>
+              <a:rPr lang="zh-CN" altLang="en-US" dirty="0" smtClean="0"/>
+              <a:t>包含通配符（</a:t>
+            </a:r>
+            <a:r>
+              <a:rPr lang="en-US" altLang="zh-CN" dirty="0" smtClean="0"/>
+              <a:t>*</a:t>
+            </a:r>
+            <a:r>
+              <a:rPr lang="zh-CN" altLang="en-US" dirty="0" smtClean="0"/>
+              <a:t>或</a:t>
+            </a:r>
+            <a:r>
+              <a:rPr lang="en-US" altLang="zh-CN" dirty="0" smtClean="0"/>
+              <a:t>?</a:t>
+            </a:r>
+            <a:r>
+              <a:rPr lang="zh-CN" altLang="en-US" dirty="0" smtClean="0"/>
+              <a:t>），则使用文件名扩展进行通配（</a:t>
+            </a:r>
+            <a:r>
+              <a:rPr lang="en-US" altLang="zh-CN" dirty="0" err="1" smtClean="0"/>
+              <a:t>globbing</a:t>
+            </a:r>
+            <a:r>
+              <a:rPr lang="zh-CN" altLang="en-US" dirty="0" smtClean="0"/>
+              <a:t>）。</a:t>
+            </a:r>
+            <a:r>
+              <a:rPr lang="en-US" altLang="zh-CN" dirty="0" smtClean="0"/>
+              <a:t>e.g. glob-for-loop.sh</a:t>
+            </a:r>
+          </a:p>
+          <a:p>
+            <a:r>
+              <a:rPr lang="zh-CN" altLang="en-US" dirty="0" smtClean="0"/>
+              <a:t>如果省略了</a:t>
+            </a:r>
+            <a:r>
+              <a:rPr lang="en-US" altLang="zh-CN" dirty="0" smtClean="0"/>
+              <a:t>for</a:t>
+            </a:r>
+            <a:r>
+              <a:rPr lang="zh-CN" altLang="en-US" dirty="0" smtClean="0"/>
+              <a:t>循环中的 </a:t>
+            </a:r>
+            <a:r>
+              <a:rPr lang="en-US" altLang="zh-CN" dirty="0" smtClean="0"/>
+              <a:t>in [list] </a:t>
+            </a:r>
+            <a:r>
+              <a:rPr lang="zh-CN" altLang="en-US" dirty="0" smtClean="0"/>
+              <a:t>部分，循环将操作</a:t>
+            </a:r>
+            <a:r>
+              <a:rPr lang="en-US" altLang="zh-CN" dirty="0" smtClean="0"/>
+              <a:t>$@ —— </a:t>
+            </a:r>
+            <a:r>
+              <a:rPr lang="zh-CN" altLang="en-US" dirty="0" smtClean="0"/>
+              <a:t>从命令行传递给脚本的位置参数。</a:t>
+            </a:r>
+            <a:r>
+              <a:rPr lang="en-US" altLang="zh-CN" dirty="0" smtClean="0"/>
+              <a:t>e.g. param-for-loop.sh</a:t>
+            </a:r>
+          </a:p>
+          <a:p>
+            <a:r>
+              <a:rPr lang="en-US" altLang="zh-CN" dirty="0" smtClean="0"/>
+              <a:t>for</a:t>
+            </a:r>
+            <a:r>
+              <a:rPr lang="zh-CN" altLang="en-US" dirty="0" smtClean="0"/>
+              <a:t>循环中的</a:t>
+            </a:r>
+            <a:r>
+              <a:rPr lang="en-US" altLang="zh-CN" dirty="0" smtClean="0"/>
+              <a:t>[list]</a:t>
+            </a:r>
+            <a:r>
+              <a:rPr lang="zh-CN" altLang="en-US" dirty="0" smtClean="0"/>
+              <a:t>可由命令替换产生。</a:t>
+            </a:r>
+            <a:r>
+              <a:rPr lang="en-US" altLang="zh-CN" dirty="0" smtClean="0"/>
+              <a:t>e.g. userlist.sh</a:t>
+            </a:r>
+          </a:p>
+          <a:p>
+            <a:r>
+              <a:rPr lang="en-US" altLang="zh-CN" dirty="0" smtClean="0"/>
+              <a:t>C</a:t>
+            </a:r>
+            <a:r>
+              <a:rPr lang="zh-CN" altLang="en-US" dirty="0" smtClean="0"/>
+              <a:t>风格的</a:t>
+            </a:r>
+            <a:r>
+              <a:rPr lang="en-US" altLang="zh-CN" dirty="0" smtClean="0"/>
+              <a:t>for</a:t>
+            </a:r>
+            <a:r>
+              <a:rPr lang="zh-CN" altLang="en-US" dirty="0" smtClean="0"/>
+              <a:t>循环（需要双圆括号结构支持）。</a:t>
+            </a:r>
+            <a:r>
+              <a:rPr lang="en-US" altLang="zh-CN" dirty="0" smtClean="0"/>
+              <a:t>e.g. c-for-loop.sh</a:t>
+            </a:r>
+          </a:p>
+        </p:txBody>
+      </p:sp>
+    </p:spTree>
+    <p:extLst>
+      <p:ext uri="{BB962C8B-B14F-4D97-AF65-F5344CB8AC3E}">
+        <p14:creationId xmlns:p14="http://schemas.microsoft.com/office/powerpoint/2010/main" val="970450889"/>
+      </p:ext>
+    </p:extLst>
+  </p:cSld>
+  <p:clrMapOvr>
+    <a:masterClrMapping/>
+  </p:clrMapOvr>
+</p:sld>
+</file>
+
+<file path=ppt/slides/slide54.xml><?xml version="1.0" encoding="utf-8"?>
+<p:sld xmlns:a="http://schemas.openxmlformats.org/drawingml/2006/main" xmlns:r="http://schemas.openxmlformats.org/officeDocument/2006/relationships" xmlns:p="http://schemas.openxmlformats.org/presentationml/2006/main">
+  <p:cSld>
+    <p:spTree>
+      <p:nvGrpSpPr>
+        <p:cNvPr id="1" name=""/>
+        <p:cNvGrpSpPr/>
+        <p:nvPr/>
+      </p:nvGrpSpPr>
+      <p:grpSpPr>
+        <a:xfrm>
+          <a:off x="0" y="0"/>
+          <a:ext cx="0" cy="0"/>
+          <a:chOff x="0" y="0"/>
+          <a:chExt cx="0" cy="0"/>
+        </a:xfrm>
+      </p:grpSpPr>
+      <p:sp>
+        <p:nvSpPr>
+          <p:cNvPr id="2" name="标题 1"/>
+          <p:cNvSpPr>
+            <a:spLocks noGrp="1"/>
+          </p:cNvSpPr>
+          <p:nvPr>
+            <p:ph type="title"/>
+          </p:nvPr>
+        </p:nvSpPr>
+        <p:spPr/>
+        <p:txBody>
+          <a:bodyPr/>
+          <a:lstStyle/>
+          <a:p>
+            <a:r>
+              <a:rPr lang="en-US" altLang="zh-CN" dirty="0" smtClean="0"/>
+              <a:t>while</a:t>
+            </a:r>
+            <a:r>
+              <a:rPr lang="zh-CN" altLang="en-US" dirty="0" smtClean="0"/>
+              <a:t>循环</a:t>
+            </a:r>
+            <a:endParaRPr lang="zh-CN" altLang="en-US" dirty="0"/>
+          </a:p>
+        </p:txBody>
+      </p:sp>
+      <p:sp>
+        <p:nvSpPr>
+          <p:cNvPr id="3" name="内容占位符 2"/>
+          <p:cNvSpPr>
+            <a:spLocks noGrp="1"/>
+          </p:cNvSpPr>
+          <p:nvPr>
+            <p:ph idx="1"/>
+          </p:nvPr>
+        </p:nvSpPr>
+        <p:spPr/>
+        <p:txBody>
+          <a:bodyPr>
+            <a:normAutofit fontScale="92500" lnSpcReduction="20000"/>
+          </a:bodyPr>
+          <a:lstStyle/>
+          <a:p>
+            <a:pPr marL="0" indent="0">
+              <a:buNone/>
+            </a:pPr>
+            <a:r>
+              <a:rPr lang="zh-CN" altLang="en-US" dirty="0"/>
+              <a:t>这种结构在循环的开头判断条件是否</a:t>
+            </a:r>
+            <a:r>
+              <a:rPr lang="zh-CN" altLang="en-US" dirty="0" smtClean="0"/>
+              <a:t>满足</a:t>
+            </a:r>
+            <a:r>
+              <a:rPr lang="zh-CN" altLang="en-US" dirty="0"/>
+              <a:t>，</a:t>
+            </a:r>
+            <a:r>
+              <a:rPr lang="zh-CN" altLang="en-US" dirty="0" smtClean="0"/>
+              <a:t>如果</a:t>
+            </a:r>
+            <a:r>
+              <a:rPr lang="zh-CN" altLang="en-US" dirty="0"/>
+              <a:t>条件一直</a:t>
+            </a:r>
+            <a:r>
+              <a:rPr lang="zh-CN" altLang="en-US" dirty="0" smtClean="0"/>
+              <a:t>满足（</a:t>
+            </a:r>
+            <a:r>
+              <a:rPr lang="zh-CN" altLang="en-US" dirty="0"/>
+              <a:t>返回</a:t>
+            </a:r>
+            <a:r>
+              <a:rPr lang="en-US" altLang="zh-CN" dirty="0"/>
+              <a:t>0</a:t>
+            </a:r>
+            <a:r>
+              <a:rPr lang="zh-CN" altLang="en-US" dirty="0"/>
+              <a:t>作为退出状态码</a:t>
+            </a:r>
+            <a:r>
+              <a:rPr lang="zh-CN" altLang="en-US" dirty="0" smtClean="0"/>
+              <a:t>），</a:t>
+            </a:r>
+            <a:r>
+              <a:rPr lang="zh-CN" altLang="en-US" dirty="0"/>
+              <a:t>则</a:t>
+            </a:r>
+            <a:r>
+              <a:rPr lang="zh-CN" altLang="en-US" dirty="0" smtClean="0"/>
+              <a:t>一直</a:t>
+            </a:r>
+            <a:r>
+              <a:rPr lang="zh-CN" altLang="en-US" dirty="0"/>
+              <a:t>循环下去 。</a:t>
+            </a:r>
+            <a:r>
+              <a:rPr lang="en-US" altLang="zh-CN" dirty="0" smtClean="0"/>
+              <a:t> </a:t>
+            </a:r>
+            <a:r>
+              <a:rPr lang="zh-CN" altLang="en-US" dirty="0"/>
+              <a:t>与</a:t>
+            </a:r>
+            <a:r>
+              <a:rPr lang="en-US" altLang="zh-CN" dirty="0"/>
+              <a:t>for</a:t>
+            </a:r>
+            <a:r>
+              <a:rPr lang="zh-CN" altLang="en-US" dirty="0"/>
+              <a:t>循环的区别</a:t>
+            </a:r>
+            <a:r>
+              <a:rPr lang="zh-CN" altLang="en-US" dirty="0" smtClean="0"/>
+              <a:t>是</a:t>
+            </a:r>
+            <a:r>
+              <a:rPr lang="zh-CN" altLang="en-US" dirty="0"/>
+              <a:t>，</a:t>
+            </a:r>
+            <a:r>
+              <a:rPr lang="en-US" altLang="zh-CN" dirty="0" smtClean="0"/>
+              <a:t>while</a:t>
+            </a:r>
+            <a:r>
+              <a:rPr lang="zh-CN" altLang="en-US" dirty="0"/>
+              <a:t>循环更适合在循环次数未知的情况</a:t>
+            </a:r>
+            <a:r>
+              <a:rPr lang="zh-CN" altLang="en-US" dirty="0" smtClean="0"/>
+              <a:t>下使用。</a:t>
+            </a:r>
+            <a:endParaRPr lang="en-US" altLang="zh-CN" dirty="0" smtClean="0"/>
+          </a:p>
+          <a:p>
+            <a:pPr marL="0" indent="0">
+              <a:buNone/>
+            </a:pPr>
+            <a:r>
+              <a:rPr lang="en-US" altLang="zh-CN" dirty="0"/>
+              <a:t>while [ condition ]</a:t>
+            </a:r>
+          </a:p>
+          <a:p>
+            <a:pPr marL="0" indent="0">
+              <a:buNone/>
+            </a:pPr>
+            <a:r>
+              <a:rPr lang="en-US" altLang="zh-CN" dirty="0" smtClean="0"/>
+              <a:t>do </a:t>
+            </a:r>
+            <a:endParaRPr lang="en-US" altLang="zh-CN" dirty="0"/>
+          </a:p>
+          <a:p>
+            <a:pPr marL="0" indent="0">
+              <a:buNone/>
+            </a:pPr>
+            <a:r>
+              <a:rPr lang="en-US" altLang="zh-CN" dirty="0"/>
+              <a:t> </a:t>
+            </a:r>
+            <a:r>
+              <a:rPr lang="en-US" altLang="zh-CN" dirty="0" smtClean="0"/>
+              <a:t>	command(s</a:t>
+            </a:r>
+            <a:r>
+              <a:rPr lang="en-US" altLang="zh-CN" dirty="0"/>
+              <a:t>)... </a:t>
+            </a:r>
+          </a:p>
+          <a:p>
+            <a:pPr marL="0" indent="0">
+              <a:buNone/>
+            </a:pPr>
+            <a:r>
+              <a:rPr lang="en-US" altLang="zh-CN" dirty="0" smtClean="0"/>
+              <a:t>done</a:t>
+            </a:r>
+          </a:p>
+          <a:p>
+            <a:pPr marL="0" indent="0">
+              <a:buNone/>
+            </a:pPr>
+            <a:r>
+              <a:rPr lang="en-US" altLang="zh-CN" dirty="0" smtClean="0"/>
+              <a:t>while</a:t>
+            </a:r>
+            <a:r>
+              <a:rPr lang="zh-CN" altLang="en-US" dirty="0" smtClean="0"/>
+              <a:t>循环中的中括号结构与</a:t>
+            </a:r>
+            <a:r>
+              <a:rPr lang="en-US" altLang="zh-CN" dirty="0" smtClean="0"/>
+              <a:t>if/then</a:t>
+            </a:r>
+            <a:r>
+              <a:rPr lang="zh-CN" altLang="en-US" dirty="0" smtClean="0"/>
+              <a:t>测试结构的中括号一样，实际上，</a:t>
+            </a:r>
+            <a:r>
+              <a:rPr lang="en-US" altLang="zh-CN" dirty="0" smtClean="0"/>
+              <a:t>while</a:t>
+            </a:r>
+            <a:r>
+              <a:rPr lang="zh-CN" altLang="en-US" dirty="0" smtClean="0"/>
+              <a:t>循环还可以使用更加灵活的双中括号结构（</a:t>
+            </a:r>
+            <a:r>
+              <a:rPr lang="en-US" altLang="zh-CN" dirty="0" smtClean="0"/>
+              <a:t>while [[ condition ]]</a:t>
+            </a:r>
+            <a:r>
+              <a:rPr lang="zh-CN" altLang="en-US" dirty="0" smtClean="0"/>
+              <a:t>）。</a:t>
+            </a:r>
+            <a:endParaRPr lang="en-US" altLang="zh-CN" dirty="0" smtClean="0"/>
+          </a:p>
+          <a:p>
+            <a:pPr marL="0" indent="0">
+              <a:buNone/>
+            </a:pPr>
+            <a:r>
+              <a:rPr lang="zh-CN" altLang="en-US" dirty="0" smtClean="0"/>
+              <a:t>与</a:t>
+            </a:r>
+            <a:r>
+              <a:rPr lang="en-US" altLang="zh-CN" dirty="0" smtClean="0"/>
+              <a:t>for</a:t>
+            </a:r>
+            <a:r>
+              <a:rPr lang="zh-CN" altLang="en-US" dirty="0" smtClean="0"/>
+              <a:t>循环一样，如果把</a:t>
+            </a:r>
+            <a:r>
+              <a:rPr lang="en-US" altLang="zh-CN" dirty="0" smtClean="0"/>
+              <a:t>do</a:t>
+            </a:r>
+            <a:r>
+              <a:rPr lang="zh-CN" altLang="en-US" dirty="0" smtClean="0"/>
+              <a:t>和条件测试语句放置同一行，则需要</a:t>
+            </a:r>
+            <a:r>
+              <a:rPr lang="en-US" altLang="zh-CN" dirty="0" smtClean="0"/>
+              <a:t>;</a:t>
+            </a:r>
+            <a:r>
+              <a:rPr lang="zh-CN" altLang="en-US" dirty="0" smtClean="0"/>
+              <a:t>号隔开：</a:t>
+            </a:r>
+            <a:endParaRPr lang="en-US" altLang="zh-CN" dirty="0" smtClean="0"/>
+          </a:p>
+          <a:p>
+            <a:pPr marL="0" indent="0">
+              <a:buNone/>
+            </a:pPr>
+            <a:r>
+              <a:rPr lang="en-US" altLang="zh-CN" dirty="0"/>
+              <a:t>while [ condition ] ; </a:t>
+            </a:r>
+            <a:r>
+              <a:rPr lang="en-US" altLang="zh-CN" dirty="0" smtClean="0"/>
+              <a:t>do</a:t>
+            </a:r>
+          </a:p>
+          <a:p>
+            <a:pPr marL="0" indent="0">
+              <a:buNone/>
+            </a:pPr>
+            <a:r>
+              <a:rPr lang="zh-CN" altLang="en-US" dirty="0" smtClean="0"/>
+              <a:t>注：</a:t>
+            </a:r>
+            <a:r>
+              <a:rPr lang="en-US" altLang="zh-CN" dirty="0" smtClean="0"/>
+              <a:t>while</a:t>
+            </a:r>
+            <a:r>
+              <a:rPr lang="zh-CN" altLang="en-US" dirty="0" smtClean="0"/>
+              <a:t>循环中的测试中括号并非必需的。</a:t>
+            </a:r>
+            <a:endParaRPr lang="en-US" altLang="zh-CN" dirty="0" smtClean="0"/>
+          </a:p>
+          <a:p>
+            <a:r>
+              <a:rPr lang="zh-CN" altLang="en-US" dirty="0"/>
+              <a:t>简单的</a:t>
+            </a:r>
+            <a:r>
+              <a:rPr lang="en-US" altLang="zh-CN" dirty="0"/>
+              <a:t>while</a:t>
+            </a:r>
+            <a:r>
+              <a:rPr lang="zh-CN" altLang="en-US" dirty="0"/>
+              <a:t>循环。</a:t>
+            </a:r>
+            <a:r>
+              <a:rPr lang="en-US" altLang="zh-CN" dirty="0"/>
+              <a:t>e.g. </a:t>
+            </a:r>
+            <a:r>
+              <a:rPr lang="en-US" altLang="zh-CN" dirty="0" smtClean="0"/>
+              <a:t>simple-while-loop.sh, simple-while-loop2.sh</a:t>
+            </a:r>
+            <a:endParaRPr lang="en-US" altLang="zh-CN" dirty="0"/>
+          </a:p>
+          <a:p>
+            <a:r>
+              <a:rPr lang="en-US" altLang="zh-CN" dirty="0"/>
+              <a:t>C</a:t>
+            </a:r>
+            <a:r>
+              <a:rPr lang="zh-CN" altLang="en-US" dirty="0"/>
+              <a:t>风格的</a:t>
+            </a:r>
+            <a:r>
+              <a:rPr lang="en-US" altLang="zh-CN" dirty="0"/>
+              <a:t>while</a:t>
+            </a:r>
+            <a:r>
+              <a:rPr lang="zh-CN" altLang="en-US" dirty="0"/>
+              <a:t>循环。</a:t>
+            </a:r>
+            <a:r>
+              <a:rPr lang="en-US" altLang="zh-CN" dirty="0"/>
+              <a:t>e.g. </a:t>
+            </a:r>
+            <a:r>
+              <a:rPr lang="en-US" altLang="zh-CN" dirty="0" smtClean="0"/>
+              <a:t>c-while-loop.sh</a:t>
+            </a:r>
+            <a:endParaRPr lang="zh-CN" altLang="en-US" dirty="0"/>
+          </a:p>
+        </p:txBody>
+      </p:sp>
+    </p:spTree>
+    <p:extLst>
+      <p:ext uri="{BB962C8B-B14F-4D97-AF65-F5344CB8AC3E}">
+        <p14:creationId xmlns:p14="http://schemas.microsoft.com/office/powerpoint/2010/main" val="3046448879"/>
+      </p:ext>
+    </p:extLst>
+  </p:cSld>
+  <p:clrMapOvr>
+    <a:masterClrMapping/>
+  </p:clrMapOvr>
+</p:sld>
+</file>
+
+<file path=ppt/slides/slide55.xml><?xml version="1.0" encoding="utf-8"?>
+<p:sld xmlns:a="http://schemas.openxmlformats.org/drawingml/2006/main" xmlns:r="http://schemas.openxmlformats.org/officeDocument/2006/relationships" xmlns:p="http://schemas.openxmlformats.org/presentationml/2006/main">
+  <p:cSld>
+    <p:spTree>
+      <p:nvGrpSpPr>
+        <p:cNvPr id="1" name=""/>
+        <p:cNvGrpSpPr/>
+        <p:nvPr/>
+      </p:nvGrpSpPr>
+      <p:grpSpPr>
+        <a:xfrm>
+          <a:off x="0" y="0"/>
+          <a:ext cx="0" cy="0"/>
+          <a:chOff x="0" y="0"/>
+          <a:chExt cx="0" cy="0"/>
+        </a:xfrm>
+      </p:grpSpPr>
+      <p:sp>
+        <p:nvSpPr>
+          <p:cNvPr id="2" name="标题 1"/>
+          <p:cNvSpPr>
+            <a:spLocks noGrp="1"/>
+          </p:cNvSpPr>
+          <p:nvPr>
+            <p:ph type="title"/>
+          </p:nvPr>
+        </p:nvSpPr>
+        <p:spPr/>
+        <p:txBody>
+          <a:bodyPr/>
+          <a:lstStyle/>
+          <a:p>
+            <a:r>
+              <a:rPr lang="en-US" altLang="zh-CN" dirty="0" smtClean="0"/>
+              <a:t>until</a:t>
+            </a:r>
+            <a:r>
+              <a:rPr lang="zh-CN" altLang="en-US" dirty="0" smtClean="0"/>
+              <a:t>循环</a:t>
+            </a:r>
+            <a:endParaRPr lang="zh-CN" altLang="en-US" dirty="0"/>
+          </a:p>
+        </p:txBody>
+      </p:sp>
+      <p:sp>
+        <p:nvSpPr>
+          <p:cNvPr id="3" name="内容占位符 2"/>
+          <p:cNvSpPr>
+            <a:spLocks noGrp="1"/>
+          </p:cNvSpPr>
+          <p:nvPr>
+            <p:ph idx="1"/>
+          </p:nvPr>
+        </p:nvSpPr>
+        <p:spPr/>
+        <p:txBody>
+          <a:bodyPr/>
+          <a:lstStyle/>
+          <a:p>
+            <a:pPr marL="0" indent="0">
+              <a:buNone/>
+            </a:pPr>
+            <a:r>
+              <a:rPr lang="zh-CN" altLang="en-US" dirty="0"/>
+              <a:t>这个结构在循环的顶部判断</a:t>
+            </a:r>
+            <a:r>
+              <a:rPr lang="zh-CN" altLang="en-US" dirty="0" smtClean="0"/>
+              <a:t>条件，如果</a:t>
+            </a:r>
+            <a:r>
+              <a:rPr lang="zh-CN" altLang="en-US" dirty="0"/>
+              <a:t>条件一直为</a:t>
+            </a:r>
+            <a:r>
+              <a:rPr lang="en-US" altLang="zh-CN" dirty="0" smtClean="0"/>
+              <a:t>false</a:t>
+            </a:r>
+            <a:r>
+              <a:rPr lang="zh-CN" altLang="en-US" dirty="0"/>
+              <a:t>（与</a:t>
+            </a:r>
+            <a:r>
+              <a:rPr lang="en-US" altLang="zh-CN" dirty="0"/>
+              <a:t>while</a:t>
+            </a:r>
+            <a:r>
+              <a:rPr lang="zh-CN" altLang="en-US" dirty="0"/>
+              <a:t>循环相反）</a:t>
+            </a:r>
+            <a:r>
+              <a:rPr lang="zh-CN" altLang="en-US" dirty="0" smtClean="0"/>
+              <a:t>，</a:t>
+            </a:r>
+            <a:r>
+              <a:rPr lang="zh-CN" altLang="en-US" dirty="0"/>
+              <a:t>则</a:t>
+            </a:r>
+            <a:r>
+              <a:rPr lang="zh-CN" altLang="en-US" dirty="0" smtClean="0"/>
+              <a:t>一直</a:t>
+            </a:r>
+            <a:r>
+              <a:rPr lang="zh-CN" altLang="en-US" dirty="0"/>
+              <a:t>循环</a:t>
+            </a:r>
+            <a:r>
+              <a:rPr lang="zh-CN" altLang="en-US" dirty="0" smtClean="0"/>
+              <a:t>下去。</a:t>
+            </a:r>
+            <a:endParaRPr lang="en-US" altLang="zh-CN" dirty="0" smtClean="0"/>
+          </a:p>
+          <a:p>
+            <a:pPr marL="0" indent="0">
+              <a:buNone/>
+            </a:pPr>
+            <a:r>
+              <a:rPr lang="en-US" altLang="zh-CN" dirty="0"/>
+              <a:t>until [ condition-is-true ]</a:t>
+            </a:r>
+          </a:p>
+          <a:p>
+            <a:pPr marL="0" indent="0">
+              <a:buNone/>
+            </a:pPr>
+            <a:r>
+              <a:rPr lang="en-US" altLang="zh-CN" dirty="0"/>
+              <a:t>do </a:t>
+            </a:r>
+          </a:p>
+          <a:p>
+            <a:pPr marL="0" indent="0">
+              <a:buNone/>
+            </a:pPr>
+            <a:r>
+              <a:rPr lang="en-US" altLang="zh-CN" dirty="0" smtClean="0"/>
+              <a:t>	command(s</a:t>
+            </a:r>
+            <a:r>
+              <a:rPr lang="en-US" altLang="zh-CN" dirty="0"/>
+              <a:t>)... </a:t>
+            </a:r>
+          </a:p>
+          <a:p>
+            <a:pPr marL="0" indent="0">
+              <a:buNone/>
+            </a:pPr>
+            <a:r>
+              <a:rPr lang="en-US" altLang="zh-CN" dirty="0" smtClean="0"/>
+              <a:t>done</a:t>
+            </a:r>
+          </a:p>
+          <a:p>
+            <a:pPr marL="0" indent="0">
+              <a:buNone/>
+            </a:pPr>
+            <a:r>
+              <a:rPr lang="zh-CN" altLang="en-US" dirty="0" smtClean="0"/>
+              <a:t>注：</a:t>
+            </a:r>
+            <a:r>
+              <a:rPr lang="en-US" altLang="zh-CN" dirty="0" smtClean="0"/>
+              <a:t>until</a:t>
+            </a:r>
+            <a:r>
+              <a:rPr lang="zh-CN" altLang="en-US" dirty="0"/>
+              <a:t>循环的条件判断在循环的</a:t>
+            </a:r>
+            <a:r>
+              <a:rPr lang="zh-CN" altLang="en-US" dirty="0" smtClean="0"/>
+              <a:t>顶部</a:t>
+            </a:r>
+            <a:r>
+              <a:rPr lang="zh-CN" altLang="en-US" dirty="0"/>
+              <a:t>，</a:t>
+            </a:r>
+            <a:r>
+              <a:rPr lang="zh-CN" altLang="en-US" dirty="0" smtClean="0"/>
+              <a:t>这</a:t>
+            </a:r>
+            <a:r>
+              <a:rPr lang="zh-CN" altLang="en-US" dirty="0"/>
+              <a:t>与某些编程语言是不同</a:t>
+            </a:r>
+            <a:r>
+              <a:rPr lang="zh-CN" altLang="en-US" dirty="0" smtClean="0"/>
+              <a:t>的。</a:t>
+            </a:r>
+            <a:endParaRPr lang="en-US" altLang="zh-CN" dirty="0" smtClean="0"/>
+          </a:p>
+          <a:p>
+            <a:pPr marL="0" indent="0">
+              <a:buNone/>
+            </a:pPr>
+            <a:r>
+              <a:rPr lang="zh-CN" altLang="en-US" dirty="0"/>
+              <a:t>与</a:t>
+            </a:r>
+            <a:r>
+              <a:rPr lang="en-US" altLang="zh-CN" dirty="0"/>
+              <a:t>for</a:t>
+            </a:r>
+            <a:r>
+              <a:rPr lang="zh-CN" altLang="en-US" dirty="0"/>
+              <a:t>循环一样，如果把</a:t>
+            </a:r>
+            <a:r>
+              <a:rPr lang="en-US" altLang="zh-CN" dirty="0"/>
+              <a:t>do</a:t>
+            </a:r>
+            <a:r>
+              <a:rPr lang="zh-CN" altLang="en-US" dirty="0"/>
+              <a:t>和条件测试语句放置同一行，则需要</a:t>
+            </a:r>
+            <a:r>
+              <a:rPr lang="en-US" altLang="zh-CN" dirty="0"/>
+              <a:t>;</a:t>
+            </a:r>
+            <a:r>
+              <a:rPr lang="zh-CN" altLang="en-US" dirty="0"/>
+              <a:t>号隔开：</a:t>
+            </a:r>
+            <a:endParaRPr lang="en-US" altLang="zh-CN" dirty="0"/>
+          </a:p>
+          <a:p>
+            <a:pPr marL="0" indent="0">
+              <a:buNone/>
+            </a:pPr>
+            <a:r>
+              <a:rPr lang="en-US" altLang="zh-CN" dirty="0"/>
+              <a:t>until [ </a:t>
+            </a:r>
+            <a:r>
+              <a:rPr lang="en-US" altLang="zh-CN" dirty="0" smtClean="0"/>
+              <a:t>condition-is-true </a:t>
+            </a:r>
+            <a:r>
+              <a:rPr lang="en-US" altLang="zh-CN" dirty="0"/>
+              <a:t>] ; </a:t>
+            </a:r>
+            <a:r>
+              <a:rPr lang="en-US" altLang="zh-CN" dirty="0" smtClean="0"/>
+              <a:t>do</a:t>
+            </a:r>
+          </a:p>
+          <a:p>
+            <a:pPr marL="0" indent="0">
+              <a:buNone/>
+            </a:pPr>
+            <a:r>
+              <a:rPr lang="en-US" altLang="zh-CN" dirty="0" smtClean="0"/>
+              <a:t>e.g. until-loop.sh</a:t>
+            </a:r>
+            <a:endParaRPr lang="zh-CN" altLang="en-US" dirty="0"/>
+          </a:p>
+        </p:txBody>
+      </p:sp>
+    </p:spTree>
+    <p:extLst>
+      <p:ext uri="{BB962C8B-B14F-4D97-AF65-F5344CB8AC3E}">
+        <p14:creationId xmlns:p14="http://schemas.microsoft.com/office/powerpoint/2010/main" val="2188594870"/>
+      </p:ext>
+    </p:extLst>
+  </p:cSld>
+  <p:clrMapOvr>
+    <a:masterClrMapping/>
+  </p:clrMapOvr>
+</p:sld>
+</file>
+
+<file path=ppt/slides/slide56.xml><?xml version="1.0" encoding="utf-8"?>
+<p:sld xmlns:a="http://schemas.openxmlformats.org/drawingml/2006/main" xmlns:r="http://schemas.openxmlformats.org/officeDocument/2006/relationships" xmlns:p="http://schemas.openxmlformats.org/presentationml/2006/main">
+  <p:cSld>
+    <p:spTree>
+      <p:nvGrpSpPr>
+        <p:cNvPr id="1" name=""/>
+        <p:cNvGrpSpPr/>
+        <p:nvPr/>
+      </p:nvGrpSpPr>
+      <p:grpSpPr>
+        <a:xfrm>
+          <a:off x="0" y="0"/>
+          <a:ext cx="0" cy="0"/>
+          <a:chOff x="0" y="0"/>
+          <a:chExt cx="0" cy="0"/>
+        </a:xfrm>
+      </p:grpSpPr>
+      <p:sp>
+        <p:nvSpPr>
+          <p:cNvPr id="2" name="标题 1"/>
+          <p:cNvSpPr>
+            <a:spLocks noGrp="1"/>
+          </p:cNvSpPr>
+          <p:nvPr>
+            <p:ph type="title"/>
+          </p:nvPr>
+        </p:nvSpPr>
+        <p:spPr/>
+        <p:txBody>
+          <a:bodyPr/>
+          <a:lstStyle/>
+          <a:p>
+            <a:r>
+              <a:rPr lang="zh-CN" altLang="en-US" dirty="0" smtClean="0"/>
+              <a:t>嵌套循环与循环控制</a:t>
+            </a:r>
+            <a:endParaRPr lang="zh-CN" altLang="en-US" dirty="0"/>
+          </a:p>
+        </p:txBody>
+      </p:sp>
+      <p:sp>
+        <p:nvSpPr>
+          <p:cNvPr id="3" name="内容占位符 2"/>
+          <p:cNvSpPr>
+            <a:spLocks noGrp="1"/>
+          </p:cNvSpPr>
+          <p:nvPr>
+            <p:ph idx="1"/>
+          </p:nvPr>
+        </p:nvSpPr>
+        <p:spPr/>
+        <p:txBody>
+          <a:bodyPr>
+            <a:normAutofit/>
+          </a:bodyPr>
+          <a:lstStyle/>
+          <a:p>
+            <a:r>
+              <a:rPr lang="zh-CN" altLang="en-US" dirty="0" smtClean="0"/>
+              <a:t>嵌套循环</a:t>
+            </a:r>
+            <a:endParaRPr lang="en-US" altLang="zh-CN" dirty="0" smtClean="0"/>
+          </a:p>
+          <a:p>
+            <a:pPr marL="0" indent="0">
+              <a:buNone/>
+            </a:pPr>
+            <a:r>
+              <a:rPr lang="zh-CN" altLang="en-US" dirty="0"/>
+              <a:t>嵌套循环就是在一个循环中还有一个</a:t>
+            </a:r>
+            <a:r>
+              <a:rPr lang="zh-CN" altLang="en-US" dirty="0" smtClean="0"/>
+              <a:t>循环</a:t>
+            </a:r>
+            <a:r>
+              <a:rPr lang="zh-CN" altLang="en-US" dirty="0"/>
+              <a:t>，</a:t>
+            </a:r>
+            <a:r>
+              <a:rPr lang="zh-CN" altLang="en-US" dirty="0" smtClean="0"/>
+              <a:t>内部</a:t>
+            </a:r>
+            <a:r>
+              <a:rPr lang="zh-CN" altLang="en-US" dirty="0"/>
+              <a:t>循环在外部循环体</a:t>
+            </a:r>
+            <a:r>
+              <a:rPr lang="zh-CN" altLang="en-US" dirty="0" smtClean="0"/>
+              <a:t>中。外部</a:t>
+            </a:r>
+            <a:r>
+              <a:rPr lang="zh-CN" altLang="en-US" dirty="0"/>
+              <a:t>循环的每次执行</a:t>
+            </a:r>
+            <a:r>
+              <a:rPr lang="zh-CN" altLang="en-US" dirty="0" smtClean="0"/>
+              <a:t>过程都会</a:t>
+            </a:r>
+            <a:r>
+              <a:rPr lang="zh-CN" altLang="en-US" dirty="0"/>
+              <a:t>触发内部</a:t>
+            </a:r>
+            <a:r>
+              <a:rPr lang="zh-CN" altLang="en-US" dirty="0" smtClean="0"/>
+              <a:t>循环</a:t>
+            </a:r>
+            <a:r>
+              <a:rPr lang="zh-CN" altLang="en-US" dirty="0"/>
+              <a:t>，</a:t>
+            </a:r>
+            <a:r>
+              <a:rPr lang="zh-CN" altLang="en-US" dirty="0" smtClean="0"/>
+              <a:t>直到外部循环</a:t>
+            </a:r>
+            <a:r>
+              <a:rPr lang="zh-CN" altLang="en-US" dirty="0"/>
+              <a:t>执行</a:t>
+            </a:r>
+            <a:r>
+              <a:rPr lang="zh-CN" altLang="en-US" dirty="0" smtClean="0"/>
+              <a:t>结束</a:t>
+            </a:r>
+            <a:r>
+              <a:rPr lang="zh-CN" altLang="en-US" dirty="0"/>
+              <a:t>。</a:t>
+            </a:r>
+            <a:r>
+              <a:rPr lang="zh-CN" altLang="en-US" dirty="0" smtClean="0"/>
+              <a:t>外部</a:t>
+            </a:r>
+            <a:r>
+              <a:rPr lang="zh-CN" altLang="en-US" dirty="0"/>
+              <a:t>循环执行了多少</a:t>
+            </a:r>
+            <a:r>
+              <a:rPr lang="zh-CN" altLang="en-US" dirty="0" smtClean="0"/>
+              <a:t>次</a:t>
+            </a:r>
+            <a:r>
+              <a:rPr lang="zh-CN" altLang="en-US" dirty="0"/>
+              <a:t>，</a:t>
+            </a:r>
+            <a:r>
+              <a:rPr lang="zh-CN" altLang="en-US" dirty="0" smtClean="0"/>
+              <a:t>内部</a:t>
+            </a:r>
+            <a:r>
+              <a:rPr lang="zh-CN" altLang="en-US" dirty="0"/>
+              <a:t>循环就完成多少</a:t>
+            </a:r>
+            <a:r>
+              <a:rPr lang="zh-CN" altLang="en-US" dirty="0" smtClean="0"/>
+              <a:t>次</a:t>
+            </a:r>
+            <a:r>
+              <a:rPr lang="zh-CN" altLang="en-US" dirty="0"/>
+              <a:t>。</a:t>
+            </a:r>
+            <a:r>
+              <a:rPr lang="zh-CN" altLang="en-US" dirty="0" smtClean="0"/>
+              <a:t>当然</a:t>
+            </a:r>
+            <a:r>
+              <a:rPr lang="zh-CN" altLang="en-US" dirty="0"/>
+              <a:t>，</a:t>
+            </a:r>
+            <a:r>
+              <a:rPr lang="zh-CN" altLang="en-US" dirty="0" smtClean="0"/>
+              <a:t>无论</a:t>
+            </a:r>
+            <a:r>
+              <a:rPr lang="zh-CN" altLang="en-US" dirty="0"/>
+              <a:t>是内部循环还是外部循环的</a:t>
+            </a:r>
+            <a:r>
+              <a:rPr lang="en-US" altLang="zh-CN" dirty="0"/>
+              <a:t>break</a:t>
+            </a:r>
+            <a:r>
+              <a:rPr lang="zh-CN" altLang="en-US" dirty="0"/>
+              <a:t>语句都会打断处理</a:t>
+            </a:r>
+            <a:r>
+              <a:rPr lang="zh-CN" altLang="en-US" dirty="0" smtClean="0"/>
+              <a:t>过程。</a:t>
+            </a:r>
+            <a:endParaRPr lang="en-US" altLang="zh-CN" dirty="0" smtClean="0"/>
+          </a:p>
+          <a:p>
+            <a:pPr marL="0" indent="0">
+              <a:buNone/>
+            </a:pPr>
+            <a:r>
+              <a:rPr lang="en-US" altLang="zh-CN" dirty="0" smtClean="0"/>
+              <a:t>e.g. nested-loop.sh</a:t>
+            </a:r>
+          </a:p>
+        </p:txBody>
+      </p:sp>
+    </p:spTree>
+    <p:extLst>
+      <p:ext uri="{BB962C8B-B14F-4D97-AF65-F5344CB8AC3E}">
+        <p14:creationId xmlns:p14="http://schemas.microsoft.com/office/powerpoint/2010/main" val="2003718951"/>
+      </p:ext>
+    </p:extLst>
+  </p:cSld>
+  <p:clrMapOvr>
+    <a:masterClrMapping/>
+  </p:clrMapOvr>
+</p:sld>
+</file>
+
+<file path=ppt/slides/slide57.xml><?xml version="1.0" encoding="utf-8"?>
+<p:sld xmlns:a="http://schemas.openxmlformats.org/drawingml/2006/main" xmlns:r="http://schemas.openxmlformats.org/officeDocument/2006/relationships" xmlns:p="http://schemas.openxmlformats.org/presentationml/2006/main">
+  <p:cSld>
+    <p:spTree>
+      <p:nvGrpSpPr>
+        <p:cNvPr id="1" name=""/>
+        <p:cNvGrpSpPr/>
+        <p:nvPr/>
+      </p:nvGrpSpPr>
+      <p:grpSpPr>
+        <a:xfrm>
+          <a:off x="0" y="0"/>
+          <a:ext cx="0" cy="0"/>
+          <a:chOff x="0" y="0"/>
+          <a:chExt cx="0" cy="0"/>
+        </a:xfrm>
+      </p:grpSpPr>
+      <p:sp>
+        <p:nvSpPr>
+          <p:cNvPr id="2" name="标题 1"/>
+          <p:cNvSpPr>
+            <a:spLocks noGrp="1"/>
+          </p:cNvSpPr>
+          <p:nvPr>
+            <p:ph type="title"/>
+          </p:nvPr>
+        </p:nvSpPr>
+        <p:spPr/>
+        <p:txBody>
+          <a:bodyPr/>
+          <a:lstStyle/>
+          <a:p>
+            <a:r>
+              <a:rPr lang="zh-CN" altLang="en-US" dirty="0"/>
+              <a:t>嵌套循环与循环控制</a:t>
+            </a:r>
+          </a:p>
+        </p:txBody>
+      </p:sp>
+      <p:sp>
+        <p:nvSpPr>
+          <p:cNvPr id="3" name="内容占位符 2"/>
+          <p:cNvSpPr>
+            <a:spLocks noGrp="1"/>
+          </p:cNvSpPr>
+          <p:nvPr>
+            <p:ph idx="1"/>
+          </p:nvPr>
+        </p:nvSpPr>
+        <p:spPr/>
+        <p:txBody>
+          <a:bodyPr/>
+          <a:lstStyle/>
+          <a:p>
+            <a:r>
+              <a:rPr lang="zh-CN" altLang="en-US" dirty="0"/>
+              <a:t>循环控制</a:t>
+            </a:r>
+            <a:endParaRPr lang="en-US" altLang="zh-CN" dirty="0"/>
+          </a:p>
+          <a:p>
+            <a:pPr marL="0" indent="0">
+              <a:buNone/>
+            </a:pPr>
+            <a:r>
+              <a:rPr lang="en-US" altLang="zh-CN" dirty="0"/>
+              <a:t>break</a:t>
+            </a:r>
+            <a:r>
+              <a:rPr lang="zh-CN" altLang="en-US" dirty="0"/>
+              <a:t>和</a:t>
+            </a:r>
+            <a:r>
+              <a:rPr lang="en-US" altLang="zh-CN" dirty="0"/>
+              <a:t>continue</a:t>
+            </a:r>
+            <a:r>
+              <a:rPr lang="zh-CN" altLang="en-US" dirty="0"/>
+              <a:t>这两个循环控制命令 </a:t>
+            </a:r>
+            <a:r>
+              <a:rPr lang="en-US" altLang="zh-CN" dirty="0"/>
+              <a:t>[1] </a:t>
+            </a:r>
+            <a:r>
+              <a:rPr lang="zh-CN" altLang="en-US" dirty="0"/>
+              <a:t>与其他语言的类似语句的行为是相同的。</a:t>
+            </a:r>
+            <a:r>
+              <a:rPr lang="en-US" altLang="zh-CN" dirty="0"/>
+              <a:t>break</a:t>
+            </a:r>
+            <a:r>
+              <a:rPr lang="zh-CN" altLang="en-US" dirty="0"/>
+              <a:t>命令终止循环（跳出循环），而</a:t>
+            </a:r>
+            <a:r>
+              <a:rPr lang="en-US" altLang="zh-CN" dirty="0"/>
+              <a:t>continue</a:t>
+            </a:r>
+            <a:r>
+              <a:rPr lang="zh-CN" altLang="en-US" dirty="0"/>
+              <a:t>命令跳到循环的下一次迭代，</a:t>
+            </a:r>
+            <a:r>
+              <a:rPr lang="zh-CN" altLang="en-US" dirty="0" smtClean="0"/>
+              <a:t>忽略</a:t>
+            </a:r>
+            <a:r>
+              <a:rPr lang="zh-CN" altLang="en-US" dirty="0"/>
+              <a:t>当前</a:t>
+            </a:r>
+            <a:r>
+              <a:rPr lang="zh-CN" altLang="en-US" dirty="0" smtClean="0"/>
+              <a:t>迭代</a:t>
+            </a:r>
+            <a:r>
+              <a:rPr lang="zh-CN" altLang="en-US" dirty="0"/>
+              <a:t>剩余的代码</a:t>
+            </a:r>
+            <a:r>
+              <a:rPr lang="zh-CN" altLang="en-US" dirty="0" smtClean="0"/>
+              <a:t>。</a:t>
+            </a:r>
+            <a:r>
+              <a:rPr lang="en-US" altLang="zh-CN" dirty="0" smtClean="0"/>
+              <a:t>e.g</a:t>
+            </a:r>
+            <a:r>
+              <a:rPr lang="en-US" altLang="zh-CN" dirty="0"/>
+              <a:t>. loop-control.sh</a:t>
+            </a:r>
+          </a:p>
+          <a:p>
+            <a:pPr marL="0" indent="0">
+              <a:buNone/>
+            </a:pPr>
+            <a:r>
+              <a:rPr lang="en-US" altLang="zh-CN" dirty="0"/>
+              <a:t>[1] </a:t>
+            </a:r>
+            <a:r>
+              <a:rPr lang="zh-CN" altLang="en-US" dirty="0"/>
+              <a:t>这两个命令是</a:t>
+            </a:r>
+            <a:r>
+              <a:rPr lang="en-US" altLang="zh-CN" dirty="0"/>
+              <a:t>shell</a:t>
+            </a:r>
+            <a:r>
+              <a:rPr lang="zh-CN" altLang="en-US" dirty="0"/>
+              <a:t>的内建命令，而不象其他的循环命令那样，比如</a:t>
+            </a:r>
+            <a:r>
+              <a:rPr lang="en-US" altLang="zh-CN" dirty="0"/>
+              <a:t>while</a:t>
+            </a:r>
+            <a:r>
+              <a:rPr lang="zh-CN" altLang="en-US" dirty="0"/>
+              <a:t>和</a:t>
+            </a:r>
+            <a:r>
+              <a:rPr lang="en-US" altLang="zh-CN" dirty="0"/>
+              <a:t>case</a:t>
+            </a:r>
+            <a:r>
+              <a:rPr lang="zh-CN" altLang="en-US" dirty="0"/>
+              <a:t>，是关键字</a:t>
+            </a:r>
+            <a:r>
+              <a:rPr lang="zh-CN" altLang="en-US" dirty="0" smtClean="0"/>
+              <a:t>。</a:t>
+            </a:r>
+            <a:endParaRPr lang="en-US" altLang="zh-CN" dirty="0" smtClean="0"/>
+          </a:p>
+          <a:p>
+            <a:pPr marL="0" indent="0">
+              <a:buNone/>
+            </a:pPr>
+            <a:r>
+              <a:rPr lang="en-US" altLang="zh-CN" dirty="0"/>
+              <a:t>break</a:t>
+            </a:r>
+            <a:r>
+              <a:rPr lang="zh-CN" altLang="en-US" dirty="0"/>
+              <a:t>命令可以带一个</a:t>
+            </a:r>
+            <a:r>
+              <a:rPr lang="zh-CN" altLang="en-US" dirty="0" smtClean="0"/>
+              <a:t>参数</a:t>
+            </a:r>
+            <a:r>
+              <a:rPr lang="zh-CN" altLang="en-US" dirty="0"/>
+              <a:t>。</a:t>
+            </a:r>
+            <a:r>
+              <a:rPr lang="zh-CN" altLang="en-US" dirty="0" smtClean="0"/>
+              <a:t>一</a:t>
+            </a:r>
+            <a:r>
+              <a:rPr lang="zh-CN" altLang="en-US" dirty="0"/>
+              <a:t>个不带参数的</a:t>
+            </a:r>
+            <a:r>
+              <a:rPr lang="en-US" altLang="zh-CN" dirty="0"/>
+              <a:t>break</a:t>
+            </a:r>
+            <a:r>
+              <a:rPr lang="zh-CN" altLang="en-US" dirty="0"/>
+              <a:t>命令</a:t>
+            </a:r>
+            <a:r>
+              <a:rPr lang="zh-CN" altLang="en-US" dirty="0" smtClean="0"/>
+              <a:t>只退出</a:t>
+            </a:r>
+            <a:r>
+              <a:rPr lang="zh-CN" altLang="en-US" dirty="0"/>
+              <a:t>最</a:t>
+            </a:r>
+            <a:r>
+              <a:rPr lang="zh-CN" altLang="en-US" dirty="0" smtClean="0"/>
+              <a:t>内层循环</a:t>
+            </a:r>
+            <a:r>
+              <a:rPr lang="zh-CN" altLang="en-US" dirty="0"/>
+              <a:t>，</a:t>
+            </a:r>
+            <a:r>
+              <a:rPr lang="zh-CN" altLang="en-US" dirty="0" smtClean="0"/>
+              <a:t>而</a:t>
+            </a:r>
+            <a:r>
+              <a:rPr lang="en-US" altLang="zh-CN" dirty="0"/>
+              <a:t>break N</a:t>
+            </a:r>
+            <a:r>
+              <a:rPr lang="zh-CN" altLang="en-US" dirty="0"/>
+              <a:t>可以退出</a:t>
+            </a:r>
+            <a:r>
+              <a:rPr lang="en-US" altLang="zh-CN" dirty="0"/>
+              <a:t>N</a:t>
+            </a:r>
+            <a:r>
+              <a:rPr lang="zh-CN" altLang="en-US" dirty="0"/>
+              <a:t>层</a:t>
+            </a:r>
+            <a:r>
+              <a:rPr lang="zh-CN" altLang="en-US" dirty="0" smtClean="0"/>
+              <a:t>循环。</a:t>
+            </a:r>
+            <a:r>
+              <a:rPr lang="en-US" altLang="zh-CN" dirty="0" smtClean="0"/>
+              <a:t>e.g. break-levels.sh</a:t>
+            </a:r>
+          </a:p>
+          <a:p>
+            <a:pPr marL="0" indent="0">
+              <a:buNone/>
+            </a:pPr>
+            <a:r>
+              <a:rPr lang="en-US" altLang="zh-CN" dirty="0"/>
+              <a:t>continue</a:t>
+            </a:r>
+            <a:r>
+              <a:rPr lang="zh-CN" altLang="en-US" dirty="0"/>
+              <a:t>命令也可以象</a:t>
+            </a:r>
+            <a:r>
+              <a:rPr lang="en-US" altLang="zh-CN" dirty="0"/>
+              <a:t>break</a:t>
+            </a:r>
+            <a:r>
+              <a:rPr lang="zh-CN" altLang="en-US" dirty="0"/>
+              <a:t>命令一样带一个</a:t>
+            </a:r>
+            <a:r>
+              <a:rPr lang="zh-CN" altLang="en-US" dirty="0" smtClean="0"/>
+              <a:t>参数。一</a:t>
+            </a:r>
+            <a:r>
+              <a:rPr lang="zh-CN" altLang="en-US" dirty="0"/>
+              <a:t>个不带参数的</a:t>
+            </a:r>
+            <a:r>
+              <a:rPr lang="en-US" altLang="zh-CN" dirty="0"/>
+              <a:t>continue</a:t>
+            </a:r>
+            <a:r>
+              <a:rPr lang="zh-CN" altLang="en-US" dirty="0"/>
+              <a:t>命令</a:t>
+            </a:r>
+            <a:r>
+              <a:rPr lang="zh-CN" altLang="en-US" dirty="0" smtClean="0"/>
+              <a:t>只忽略所在层循环当前迭代剩余的代码，并开始下一次迭代，</a:t>
+            </a:r>
+            <a:r>
+              <a:rPr lang="en-US" altLang="zh-CN" dirty="0" smtClean="0"/>
+              <a:t> </a:t>
+            </a:r>
+            <a:r>
+              <a:rPr lang="zh-CN" altLang="en-US" dirty="0"/>
+              <a:t>而</a:t>
+            </a:r>
+            <a:r>
+              <a:rPr lang="en-US" altLang="zh-CN" dirty="0"/>
+              <a:t>continue </a:t>
+            </a:r>
+            <a:r>
+              <a:rPr lang="en-US" altLang="zh-CN" dirty="0" smtClean="0"/>
+              <a:t>N</a:t>
+            </a:r>
+            <a:r>
+              <a:rPr lang="zh-CN" altLang="en-US" dirty="0" smtClean="0"/>
+              <a:t>终止所在层循环剩余的迭代，并开始其上第</a:t>
+            </a:r>
+            <a:r>
+              <a:rPr lang="en-US" altLang="zh-CN" dirty="0" smtClean="0"/>
+              <a:t>N</a:t>
+            </a:r>
+            <a:r>
+              <a:rPr lang="zh-CN" altLang="en-US" dirty="0" smtClean="0"/>
+              <a:t>层循环的下一次迭代。</a:t>
+            </a:r>
+            <a:r>
+              <a:rPr lang="en-US" altLang="zh-CN" dirty="0" smtClean="0"/>
+              <a:t>e.g. continue-levels.sh</a:t>
+            </a:r>
+            <a:endParaRPr lang="zh-CN" altLang="en-US" dirty="0"/>
+          </a:p>
+          <a:p>
+            <a:endParaRPr lang="zh-CN" altLang="en-US" dirty="0"/>
+          </a:p>
+        </p:txBody>
+      </p:sp>
+    </p:spTree>
+    <p:extLst>
+      <p:ext uri="{BB962C8B-B14F-4D97-AF65-F5344CB8AC3E}">
+        <p14:creationId xmlns:p14="http://schemas.microsoft.com/office/powerpoint/2010/main" val="828505919"/>
+      </p:ext>
+    </p:extLst>
+  </p:cSld>
+  <p:clrMapOvr>
+    <a:masterClrMapping/>
+  </p:clrMapOvr>
+</p:sld>
+</file>
+
+<file path=ppt/slides/slide58.xml><?xml version="1.0" encoding="utf-8"?>
+<p:sld xmlns:a="http://schemas.openxmlformats.org/drawingml/2006/main" xmlns:r="http://schemas.openxmlformats.org/officeDocument/2006/relationships" xmlns:p="http://schemas.openxmlformats.org/presentationml/2006/main">
+  <p:cSld>
+    <p:spTree>
+      <p:nvGrpSpPr>
+        <p:cNvPr id="1" name=""/>
+        <p:cNvGrpSpPr/>
+        <p:nvPr/>
+      </p:nvGrpSpPr>
+      <p:grpSpPr>
+        <a:xfrm>
+          <a:off x="0" y="0"/>
+          <a:ext cx="0" cy="0"/>
+          <a:chOff x="0" y="0"/>
+          <a:chExt cx="0" cy="0"/>
+        </a:xfrm>
+      </p:grpSpPr>
+      <p:sp>
+        <p:nvSpPr>
+          <p:cNvPr id="2" name="标题 1"/>
+          <p:cNvSpPr>
+            <a:spLocks noGrp="1"/>
+          </p:cNvSpPr>
+          <p:nvPr>
+            <p:ph type="title"/>
+          </p:nvPr>
+        </p:nvSpPr>
+        <p:spPr/>
+        <p:txBody>
+          <a:bodyPr/>
+          <a:lstStyle/>
+          <a:p>
+            <a:r>
+              <a:rPr lang="en-US" altLang="zh-CN" dirty="0" smtClean="0"/>
+              <a:t>case</a:t>
+            </a:r>
+            <a:r>
+              <a:rPr lang="zh-CN" altLang="en-US" dirty="0" smtClean="0"/>
+              <a:t>语句</a:t>
+            </a:r>
+            <a:endParaRPr lang="zh-CN" altLang="en-US" dirty="0"/>
+          </a:p>
+        </p:txBody>
+      </p:sp>
+      <p:sp>
+        <p:nvSpPr>
+          <p:cNvPr id="3" name="内容占位符 2"/>
+          <p:cNvSpPr>
+            <a:spLocks noGrp="1"/>
+          </p:cNvSpPr>
+          <p:nvPr>
+            <p:ph idx="1"/>
+          </p:nvPr>
+        </p:nvSpPr>
+        <p:spPr/>
+        <p:txBody>
+          <a:bodyPr>
+            <a:normAutofit fontScale="92500" lnSpcReduction="10000"/>
+          </a:bodyPr>
+          <a:lstStyle/>
+          <a:p>
+            <a:pPr marL="0" indent="0">
+              <a:buNone/>
+            </a:pPr>
+            <a:r>
+              <a:rPr lang="zh-CN" altLang="en-US" dirty="0" smtClean="0"/>
+              <a:t>在代码块中控制程序流（分支）</a:t>
+            </a:r>
+            <a:endParaRPr lang="en-US" altLang="zh-CN" dirty="0" smtClean="0"/>
+          </a:p>
+          <a:p>
+            <a:pPr marL="0" indent="0">
+              <a:buNone/>
+            </a:pPr>
+            <a:r>
+              <a:rPr lang="en-US" altLang="zh-CN" dirty="0"/>
+              <a:t>case (in) / </a:t>
+            </a:r>
+            <a:r>
+              <a:rPr lang="en-US" altLang="zh-CN" dirty="0" err="1" smtClean="0"/>
+              <a:t>esac</a:t>
+            </a:r>
+            <a:endParaRPr lang="en-US" altLang="zh-CN" dirty="0" smtClean="0"/>
+          </a:p>
+          <a:p>
+            <a:pPr marL="0" indent="0">
+              <a:buNone/>
+            </a:pPr>
+            <a:r>
+              <a:rPr lang="en-US" altLang="zh-CN" dirty="0"/>
+              <a:t>	</a:t>
+            </a:r>
+            <a:r>
+              <a:rPr lang="zh-CN" altLang="en-US" dirty="0"/>
+              <a:t>在</a:t>
+            </a:r>
+            <a:r>
+              <a:rPr lang="en-US" altLang="zh-CN" dirty="0"/>
+              <a:t>shell</a:t>
+            </a:r>
+            <a:r>
+              <a:rPr lang="zh-CN" altLang="en-US" dirty="0"/>
+              <a:t>中的</a:t>
+            </a:r>
+            <a:r>
+              <a:rPr lang="en-US" altLang="zh-CN" dirty="0"/>
+              <a:t>case</a:t>
+            </a:r>
+            <a:r>
+              <a:rPr lang="zh-CN" altLang="en-US" dirty="0"/>
+              <a:t>结构与</a:t>
+            </a:r>
+            <a:r>
+              <a:rPr lang="en-US" altLang="zh-CN" dirty="0"/>
+              <a:t>C/C++</a:t>
+            </a:r>
+            <a:r>
+              <a:rPr lang="zh-CN" altLang="en-US" dirty="0"/>
+              <a:t>中的</a:t>
+            </a:r>
+            <a:r>
+              <a:rPr lang="en-US" altLang="zh-CN" dirty="0"/>
+              <a:t>switch</a:t>
+            </a:r>
+            <a:r>
+              <a:rPr lang="zh-CN" altLang="en-US" dirty="0" smtClean="0"/>
+              <a:t>结构类似，它</a:t>
+            </a:r>
+            <a:r>
+              <a:rPr lang="zh-CN" altLang="en-US" dirty="0"/>
+              <a:t>允许通过判断来</a:t>
+            </a:r>
+            <a:r>
+              <a:rPr lang="zh-CN" altLang="en-US" dirty="0" smtClean="0"/>
+              <a:t>选择多个代码</a:t>
+            </a:r>
+            <a:r>
+              <a:rPr lang="zh-CN" altLang="en-US" dirty="0"/>
+              <a:t>块</a:t>
+            </a:r>
+            <a:r>
+              <a:rPr lang="zh-CN" altLang="en-US" dirty="0" smtClean="0"/>
+              <a:t>中的一个。它相当于多</a:t>
+            </a:r>
+            <a:r>
+              <a:rPr lang="zh-CN" altLang="en-US" dirty="0"/>
+              <a:t>个</a:t>
+            </a:r>
+            <a:r>
+              <a:rPr lang="en-US" altLang="zh-CN" dirty="0"/>
+              <a:t>if/then/else</a:t>
+            </a:r>
+            <a:r>
+              <a:rPr lang="zh-CN" altLang="en-US" dirty="0" smtClean="0"/>
+              <a:t>语句的简化结构，是一个创建菜单的合适工具。</a:t>
+            </a:r>
+            <a:endParaRPr lang="en-US" altLang="zh-CN" dirty="0" smtClean="0"/>
+          </a:p>
+          <a:p>
+            <a:pPr marL="0" indent="0">
+              <a:buNone/>
+            </a:pPr>
+            <a:r>
+              <a:rPr lang="en-US" altLang="zh-CN" dirty="0"/>
+              <a:t>case "$variable" in </a:t>
+            </a:r>
+          </a:p>
+          <a:p>
+            <a:pPr marL="0" indent="0">
+              <a:buNone/>
+            </a:pPr>
+            <a:r>
+              <a:rPr lang="en-US" altLang="zh-CN" dirty="0"/>
+              <a:t> "$condition1" ) </a:t>
+            </a:r>
+          </a:p>
+          <a:p>
+            <a:pPr marL="0" indent="0">
+              <a:buNone/>
+            </a:pPr>
+            <a:r>
+              <a:rPr lang="en-US" altLang="zh-CN" dirty="0"/>
+              <a:t> command... </a:t>
+            </a:r>
+          </a:p>
+          <a:p>
+            <a:pPr marL="0" indent="0">
+              <a:buNone/>
+            </a:pPr>
+            <a:r>
+              <a:rPr lang="en-US" altLang="zh-CN" dirty="0"/>
+              <a:t> ;; </a:t>
+            </a:r>
+          </a:p>
+          <a:p>
+            <a:pPr marL="0" indent="0">
+              <a:buNone/>
+            </a:pPr>
+            <a:r>
+              <a:rPr lang="en-US" altLang="zh-CN" dirty="0"/>
+              <a:t> "$condition2" ) </a:t>
+            </a:r>
+          </a:p>
+          <a:p>
+            <a:pPr marL="0" indent="0">
+              <a:buNone/>
+            </a:pPr>
+            <a:r>
+              <a:rPr lang="en-US" altLang="zh-CN" dirty="0"/>
+              <a:t> command... </a:t>
+            </a:r>
+          </a:p>
+          <a:p>
+            <a:pPr marL="0" indent="0">
+              <a:buNone/>
+            </a:pPr>
+            <a:r>
+              <a:rPr lang="en-US" altLang="zh-CN" dirty="0"/>
+              <a:t> ;; </a:t>
+            </a:r>
+          </a:p>
+          <a:p>
+            <a:pPr marL="0" indent="0">
+              <a:buNone/>
+            </a:pPr>
+            <a:r>
+              <a:rPr lang="en-US" altLang="zh-CN" dirty="0" err="1"/>
+              <a:t>esac</a:t>
+            </a:r>
+            <a:endParaRPr lang="zh-CN" altLang="en-US" dirty="0"/>
+          </a:p>
+        </p:txBody>
+      </p:sp>
+    </p:spTree>
+    <p:extLst>
+      <p:ext uri="{BB962C8B-B14F-4D97-AF65-F5344CB8AC3E}">
+        <p14:creationId xmlns:p14="http://schemas.microsoft.com/office/powerpoint/2010/main" val="2901709496"/>
+      </p:ext>
+    </p:extLst>
+  </p:cSld>
+  <p:clrMapOvr>
+    <a:masterClrMapping/>
+  </p:clrMapOvr>
+</p:sld>
+</file>
+
+<file path=ppt/slides/slide59.xml><?xml version="1.0" encoding="utf-8"?>
+<p:sld xmlns:a="http://schemas.openxmlformats.org/drawingml/2006/main" xmlns:r="http://schemas.openxmlformats.org/officeDocument/2006/relationships" xmlns:p="http://schemas.openxmlformats.org/presentationml/2006/main">
+  <p:cSld>
+    <p:spTree>
+      <p:nvGrpSpPr>
+        <p:cNvPr id="1" name=""/>
+        <p:cNvGrpSpPr/>
+        <p:nvPr/>
+      </p:nvGrpSpPr>
+      <p:grpSpPr>
+        <a:xfrm>
+          <a:off x="0" y="0"/>
+          <a:ext cx="0" cy="0"/>
+          <a:chOff x="0" y="0"/>
+          <a:chExt cx="0" cy="0"/>
+        </a:xfrm>
+      </p:grpSpPr>
+      <p:sp>
+        <p:nvSpPr>
+          <p:cNvPr id="2" name="标题 1"/>
+          <p:cNvSpPr>
+            <a:spLocks noGrp="1"/>
+          </p:cNvSpPr>
+          <p:nvPr>
+            <p:ph type="title"/>
+          </p:nvPr>
+        </p:nvSpPr>
+        <p:spPr/>
+        <p:txBody>
+          <a:bodyPr/>
+          <a:lstStyle/>
+          <a:p>
+            <a:r>
+              <a:rPr lang="en-US" altLang="zh-CN" dirty="0"/>
+              <a:t>case</a:t>
+            </a:r>
+            <a:r>
+              <a:rPr lang="zh-CN" altLang="en-US" dirty="0"/>
+              <a:t>语句</a:t>
+            </a:r>
+          </a:p>
+        </p:txBody>
+      </p:sp>
+      <p:sp>
+        <p:nvSpPr>
+          <p:cNvPr id="3" name="内容占位符 2"/>
+          <p:cNvSpPr>
+            <a:spLocks noGrp="1"/>
+          </p:cNvSpPr>
+          <p:nvPr>
+            <p:ph idx="1"/>
+          </p:nvPr>
+        </p:nvSpPr>
+        <p:spPr/>
+        <p:txBody>
+          <a:bodyPr/>
+          <a:lstStyle/>
+          <a:p>
+            <a:r>
+              <a:rPr lang="zh-CN" altLang="en-US" dirty="0"/>
+              <a:t>对</a:t>
+            </a:r>
+            <a:r>
+              <a:rPr lang="zh-CN" altLang="en-US" dirty="0" smtClean="0"/>
+              <a:t>变量引用（</a:t>
+            </a:r>
+            <a:r>
+              <a:rPr lang="en-US" altLang="zh-CN" dirty="0" smtClean="0"/>
+              <a:t>quoting</a:t>
+            </a:r>
+            <a:r>
+              <a:rPr lang="zh-CN" altLang="en-US" dirty="0" smtClean="0"/>
+              <a:t>）并不是强制的，因为</a:t>
+            </a:r>
+            <a:r>
+              <a:rPr lang="zh-CN" altLang="en-US" dirty="0"/>
+              <a:t>不会发生单词</a:t>
+            </a:r>
+            <a:r>
+              <a:rPr lang="zh-CN" altLang="en-US" dirty="0" smtClean="0"/>
+              <a:t>分割。</a:t>
+            </a:r>
+            <a:endParaRPr lang="en-US" altLang="zh-CN" dirty="0" smtClean="0"/>
+          </a:p>
+          <a:p>
+            <a:r>
+              <a:rPr lang="zh-CN" altLang="en-US" dirty="0"/>
+              <a:t>每句测试</a:t>
+            </a:r>
+            <a:r>
+              <a:rPr lang="zh-CN" altLang="en-US" dirty="0" smtClean="0"/>
+              <a:t>行</a:t>
+            </a:r>
+            <a:r>
+              <a:rPr lang="zh-CN" altLang="en-US" dirty="0"/>
+              <a:t>，</a:t>
+            </a:r>
+            <a:r>
+              <a:rPr lang="zh-CN" altLang="en-US" dirty="0" smtClean="0"/>
+              <a:t>都</a:t>
+            </a:r>
+            <a:r>
+              <a:rPr lang="zh-CN" altLang="en-US" dirty="0"/>
+              <a:t>以右小括号</a:t>
+            </a:r>
+            <a:r>
+              <a:rPr lang="en-US" altLang="zh-CN" dirty="0"/>
+              <a:t>)</a:t>
+            </a:r>
+            <a:r>
+              <a:rPr lang="zh-CN" altLang="en-US" dirty="0"/>
+              <a:t>来</a:t>
+            </a:r>
+            <a:r>
+              <a:rPr lang="zh-CN" altLang="en-US" dirty="0" smtClean="0"/>
+              <a:t>结尾。</a:t>
+            </a:r>
+            <a:endParaRPr lang="en-US" altLang="zh-CN" dirty="0" smtClean="0"/>
+          </a:p>
+          <a:p>
+            <a:r>
+              <a:rPr lang="zh-CN" altLang="en-US" dirty="0"/>
+              <a:t>每个条件判断语句块都以一对分号结尾 </a:t>
+            </a:r>
+            <a:r>
+              <a:rPr lang="en-US" altLang="zh-CN" dirty="0" smtClean="0"/>
+              <a:t>;;</a:t>
+            </a:r>
+            <a:r>
+              <a:rPr lang="zh-CN" altLang="en-US" dirty="0" smtClean="0"/>
+              <a:t>。</a:t>
+            </a:r>
+            <a:endParaRPr lang="en-US" altLang="zh-CN" dirty="0" smtClean="0"/>
+          </a:p>
+          <a:p>
+            <a:r>
+              <a:rPr lang="en-US" altLang="zh-CN" dirty="0"/>
+              <a:t>case</a:t>
+            </a:r>
+            <a:r>
+              <a:rPr lang="zh-CN" altLang="en-US" dirty="0"/>
+              <a:t>块以</a:t>
+            </a:r>
+            <a:r>
+              <a:rPr lang="en-US" altLang="zh-CN" dirty="0" err="1"/>
+              <a:t>esac</a:t>
+            </a:r>
+            <a:r>
+              <a:rPr lang="en-US" altLang="zh-CN" dirty="0"/>
+              <a:t> </a:t>
+            </a:r>
+            <a:r>
+              <a:rPr lang="zh-CN" altLang="en-US" dirty="0" smtClean="0"/>
+              <a:t>（</a:t>
+            </a:r>
+            <a:r>
+              <a:rPr lang="en-US" altLang="zh-CN" dirty="0"/>
+              <a:t>case</a:t>
+            </a:r>
+            <a:r>
+              <a:rPr lang="zh-CN" altLang="en-US" dirty="0"/>
+              <a:t>的反向拼写</a:t>
+            </a:r>
+            <a:r>
+              <a:rPr lang="zh-CN" altLang="en-US" dirty="0" smtClean="0"/>
+              <a:t>）结尾。</a:t>
+            </a:r>
+            <a:endParaRPr lang="en-US" altLang="zh-CN" dirty="0" smtClean="0"/>
+          </a:p>
+          <a:p>
+            <a:pPr marL="0" indent="0">
+              <a:buNone/>
+            </a:pPr>
+            <a:r>
+              <a:rPr lang="zh-CN" altLang="en-US" dirty="0" smtClean="0"/>
+              <a:t>使用</a:t>
+            </a:r>
+            <a:r>
+              <a:rPr lang="en-US" altLang="zh-CN" dirty="0" smtClean="0"/>
+              <a:t>case</a:t>
+            </a:r>
+            <a:r>
+              <a:rPr lang="zh-CN" altLang="en-US" dirty="0" smtClean="0"/>
+              <a:t>语句：</a:t>
+            </a:r>
+            <a:endParaRPr lang="en-US" altLang="zh-CN" dirty="0" smtClean="0"/>
+          </a:p>
+          <a:p>
+            <a:pPr>
+              <a:buFont typeface="Wingdings" panose="05000000000000000000" pitchFamily="2" charset="2"/>
+              <a:buChar char="Ø"/>
+            </a:pPr>
+            <a:r>
+              <a:rPr lang="zh-CN" altLang="en-US" dirty="0" smtClean="0"/>
+              <a:t>创建菜单。</a:t>
+            </a:r>
+            <a:r>
+              <a:rPr lang="en-US" altLang="zh-CN" dirty="0" smtClean="0"/>
+              <a:t>e.g. addr-book.sh</a:t>
+            </a:r>
+          </a:p>
+          <a:p>
+            <a:pPr>
+              <a:buFont typeface="Wingdings" panose="05000000000000000000" pitchFamily="2" charset="2"/>
+              <a:buChar char="Ø"/>
+            </a:pPr>
+            <a:r>
+              <a:rPr lang="zh-CN" altLang="en-US" dirty="0" smtClean="0"/>
+              <a:t>处理命令行参数。</a:t>
+            </a:r>
+            <a:r>
+              <a:rPr lang="en-US" altLang="zh-CN" dirty="0" smtClean="0"/>
+              <a:t>e.g. cmdline-param.sh</a:t>
+            </a:r>
+          </a:p>
+          <a:p>
+            <a:pPr>
+              <a:buFont typeface="Wingdings" panose="05000000000000000000" pitchFamily="2" charset="2"/>
+              <a:buChar char="Ø"/>
+            </a:pPr>
+            <a:r>
+              <a:rPr lang="zh-CN" altLang="en-US" dirty="0" smtClean="0"/>
+              <a:t>使用命令替换产生</a:t>
+            </a:r>
+            <a:r>
+              <a:rPr lang="en-US" altLang="zh-CN" dirty="0" smtClean="0"/>
+              <a:t>case</a:t>
+            </a:r>
+            <a:r>
+              <a:rPr lang="zh-CN" altLang="en-US" dirty="0" smtClean="0"/>
+              <a:t>变量。</a:t>
+            </a:r>
+            <a:r>
+              <a:rPr lang="en-US" altLang="zh-CN" dirty="0" smtClean="0"/>
+              <a:t>e.g. case-cmd.sh</a:t>
+            </a:r>
+            <a:endParaRPr lang="zh-CN" altLang="en-US" dirty="0"/>
+          </a:p>
+        </p:txBody>
+      </p:sp>
+    </p:spTree>
+    <p:extLst>
+      <p:ext uri="{BB962C8B-B14F-4D97-AF65-F5344CB8AC3E}">
+        <p14:creationId xmlns:p14="http://schemas.microsoft.com/office/powerpoint/2010/main" val="2223913449"/>
+      </p:ext>
+    </p:extLst>
+  </p:cSld>
+  <p:clrMapOvr>
+    <a:masterClrMapping/>
+  </p:clrMapOvr>
 </p:sld>
 </file>
 
@@ -20362,6 +22589,1283 @@
     <p:extLst>
       <p:ext uri="{BB962C8B-B14F-4D97-AF65-F5344CB8AC3E}">
         <p14:creationId xmlns:p14="http://schemas.microsoft.com/office/powerpoint/2010/main" val="1531037949"/>
+      </p:ext>
+    </p:extLst>
+  </p:cSld>
+  <p:clrMapOvr>
+    <a:masterClrMapping/>
+  </p:clrMapOvr>
+  <p:timing>
+    <p:tnLst>
+      <p:par>
+        <p:cTn id="1" dur="indefinite" restart="never" nodeType="tmRoot"/>
+      </p:par>
+    </p:tnLst>
+  </p:timing>
+</p:sld>
+</file>
+
+<file path=ppt/slides/slide60.xml><?xml version="1.0" encoding="utf-8"?>
+<p:sld xmlns:a="http://schemas.openxmlformats.org/drawingml/2006/main" xmlns:r="http://schemas.openxmlformats.org/officeDocument/2006/relationships" xmlns:p="http://schemas.openxmlformats.org/presentationml/2006/main">
+  <p:cSld>
+    <p:spTree>
+      <p:nvGrpSpPr>
+        <p:cNvPr id="1" name=""/>
+        <p:cNvGrpSpPr/>
+        <p:nvPr/>
+      </p:nvGrpSpPr>
+      <p:grpSpPr>
+        <a:xfrm>
+          <a:off x="0" y="0"/>
+          <a:ext cx="0" cy="0"/>
+          <a:chOff x="0" y="0"/>
+          <a:chExt cx="0" cy="0"/>
+        </a:xfrm>
+      </p:grpSpPr>
+      <p:sp>
+        <p:nvSpPr>
+          <p:cNvPr id="2" name="标题 1"/>
+          <p:cNvSpPr>
+            <a:spLocks noGrp="1"/>
+          </p:cNvSpPr>
+          <p:nvPr>
+            <p:ph type="title"/>
+          </p:nvPr>
+        </p:nvSpPr>
+        <p:spPr/>
+        <p:txBody>
+          <a:bodyPr/>
+          <a:lstStyle/>
+          <a:p>
+            <a:r>
+              <a:rPr lang="en-US" altLang="zh-CN" dirty="0" smtClean="0"/>
+              <a:t>select</a:t>
+            </a:r>
+            <a:r>
+              <a:rPr lang="zh-CN" altLang="en-US" dirty="0" smtClean="0"/>
+              <a:t>语句</a:t>
+            </a:r>
+            <a:endParaRPr lang="zh-CN" altLang="en-US" dirty="0"/>
+          </a:p>
+        </p:txBody>
+      </p:sp>
+      <p:sp>
+        <p:nvSpPr>
+          <p:cNvPr id="3" name="内容占位符 2"/>
+          <p:cNvSpPr>
+            <a:spLocks noGrp="1"/>
+          </p:cNvSpPr>
+          <p:nvPr>
+            <p:ph idx="1"/>
+          </p:nvPr>
+        </p:nvSpPr>
+        <p:spPr/>
+        <p:txBody>
+          <a:bodyPr/>
+          <a:lstStyle/>
+          <a:p>
+            <a:pPr marL="0" indent="0">
+              <a:buNone/>
+            </a:pPr>
+            <a:r>
+              <a:rPr lang="en-US" altLang="zh-CN" dirty="0" smtClean="0"/>
+              <a:t>select</a:t>
+            </a:r>
+            <a:r>
+              <a:rPr lang="zh-CN" altLang="en-US" dirty="0" smtClean="0"/>
+              <a:t>结构是建立菜单的另一种工具。</a:t>
+            </a:r>
+            <a:endParaRPr lang="en-US" altLang="zh-CN" dirty="0" smtClean="0"/>
+          </a:p>
+          <a:p>
+            <a:pPr marL="0" indent="0">
+              <a:buNone/>
+            </a:pPr>
+            <a:r>
+              <a:rPr lang="en-US" altLang="zh-CN" dirty="0"/>
+              <a:t>select variable [in list]</a:t>
+            </a:r>
+          </a:p>
+          <a:p>
+            <a:pPr marL="0" indent="0">
+              <a:buNone/>
+            </a:pPr>
+            <a:r>
+              <a:rPr lang="en-US" altLang="zh-CN" dirty="0"/>
+              <a:t>do </a:t>
+            </a:r>
+          </a:p>
+          <a:p>
+            <a:pPr marL="0" indent="0">
+              <a:buNone/>
+            </a:pPr>
+            <a:r>
+              <a:rPr lang="en-US" altLang="zh-CN" dirty="0" smtClean="0"/>
+              <a:t>	command</a:t>
+            </a:r>
+            <a:r>
+              <a:rPr lang="en-US" altLang="zh-CN" dirty="0"/>
+              <a:t>... </a:t>
+            </a:r>
+          </a:p>
+          <a:p>
+            <a:pPr marL="0" indent="0">
+              <a:buNone/>
+            </a:pPr>
+            <a:r>
+              <a:rPr lang="en-US" altLang="zh-CN" dirty="0" smtClean="0"/>
+              <a:t>	break </a:t>
+            </a:r>
+            <a:endParaRPr lang="en-US" altLang="zh-CN" dirty="0"/>
+          </a:p>
+          <a:p>
+            <a:pPr marL="0" indent="0">
+              <a:buNone/>
+            </a:pPr>
+            <a:r>
+              <a:rPr lang="en-US" altLang="zh-CN" dirty="0" smtClean="0"/>
+              <a:t>done</a:t>
+            </a:r>
+          </a:p>
+          <a:p>
+            <a:pPr marL="0" indent="0">
+              <a:buNone/>
+            </a:pPr>
+            <a:r>
+              <a:rPr lang="zh-CN" altLang="en-US" dirty="0" smtClean="0"/>
+              <a:t>这提示用户选择</a:t>
+            </a:r>
+            <a:r>
+              <a:rPr lang="en-US" altLang="zh-CN" dirty="0" smtClean="0"/>
+              <a:t>variable</a:t>
+            </a:r>
+            <a:r>
+              <a:rPr lang="zh-CN" altLang="en-US" dirty="0" smtClean="0"/>
+              <a:t>列表中的一个选项，注：</a:t>
+            </a:r>
+            <a:r>
+              <a:rPr lang="en-US" altLang="zh-CN" dirty="0" smtClean="0"/>
+              <a:t>select</a:t>
+            </a:r>
+            <a:r>
+              <a:rPr lang="zh-CN" altLang="en-US" dirty="0" smtClean="0"/>
+              <a:t>使用</a:t>
+            </a:r>
+            <a:r>
+              <a:rPr lang="en-US" altLang="zh-CN" dirty="0" smtClean="0"/>
+              <a:t>$PS3</a:t>
+            </a:r>
+            <a:r>
+              <a:rPr lang="zh-CN" altLang="en-US" dirty="0" smtClean="0"/>
+              <a:t>提示符，默认为（</a:t>
+            </a:r>
+            <a:r>
+              <a:rPr lang="en-US" altLang="zh-CN" dirty="0" smtClean="0"/>
+              <a:t>#?</a:t>
+            </a:r>
+            <a:r>
+              <a:rPr lang="zh-CN" altLang="en-US" dirty="0" smtClean="0"/>
+              <a:t>），当然，这可以修改。</a:t>
+            </a:r>
+            <a:r>
+              <a:rPr lang="en-US" altLang="zh-CN" dirty="0" smtClean="0"/>
+              <a:t>e.g. select.sh</a:t>
+            </a:r>
+          </a:p>
+          <a:p>
+            <a:pPr marL="0" indent="0">
+              <a:buNone/>
+            </a:pPr>
+            <a:r>
+              <a:rPr lang="zh-CN" altLang="en-US" dirty="0" smtClean="0"/>
+              <a:t>如果省略了</a:t>
+            </a:r>
+            <a:r>
+              <a:rPr lang="en-US" altLang="zh-CN" dirty="0" smtClean="0"/>
+              <a:t>in list</a:t>
+            </a:r>
+            <a:r>
+              <a:rPr lang="zh-CN" altLang="en-US" dirty="0" smtClean="0"/>
+              <a:t>列表，</a:t>
+            </a:r>
+            <a:r>
+              <a:rPr lang="en-US" altLang="zh-CN" dirty="0" smtClean="0"/>
+              <a:t>select</a:t>
+            </a:r>
+            <a:r>
+              <a:rPr lang="zh-CN" altLang="en-US" dirty="0" smtClean="0"/>
+              <a:t>将使用传递给包含有</a:t>
+            </a:r>
+            <a:r>
+              <a:rPr lang="en-US" altLang="zh-CN" dirty="0" smtClean="0"/>
+              <a:t>select</a:t>
+            </a:r>
+            <a:r>
+              <a:rPr lang="zh-CN" altLang="en-US" dirty="0" smtClean="0"/>
+              <a:t>结构的脚本或函数的命令行参数列表（</a:t>
+            </a:r>
+            <a:r>
+              <a:rPr lang="en-US" altLang="zh-CN" dirty="0" smtClean="0"/>
+              <a:t>$@</a:t>
+            </a:r>
+            <a:r>
+              <a:rPr lang="zh-CN" altLang="en-US" dirty="0" smtClean="0"/>
+              <a:t>）。</a:t>
+            </a:r>
+            <a:endParaRPr lang="en-US" altLang="zh-CN" dirty="0" smtClean="0"/>
+          </a:p>
+          <a:p>
+            <a:pPr marL="0" indent="0">
+              <a:buNone/>
+            </a:pPr>
+            <a:r>
+              <a:rPr lang="en-US" altLang="zh-CN" dirty="0" smtClean="0"/>
+              <a:t>e.g. select-1.sh</a:t>
+            </a:r>
+          </a:p>
+        </p:txBody>
+      </p:sp>
+    </p:spTree>
+    <p:extLst>
+      <p:ext uri="{BB962C8B-B14F-4D97-AF65-F5344CB8AC3E}">
+        <p14:creationId xmlns:p14="http://schemas.microsoft.com/office/powerpoint/2010/main" val="153384496"/>
+      </p:ext>
+    </p:extLst>
+  </p:cSld>
+  <p:clrMapOvr>
+    <a:masterClrMapping/>
+  </p:clrMapOvr>
+</p:sld>
+</file>
+
+<file path=ppt/slides/slide61.xml><?xml version="1.0" encoding="utf-8"?>
+<p:sld xmlns:a="http://schemas.openxmlformats.org/drawingml/2006/main" xmlns:r="http://schemas.openxmlformats.org/officeDocument/2006/relationships" xmlns:p="http://schemas.openxmlformats.org/presentationml/2006/main">
+  <p:cSld>
+    <p:spTree>
+      <p:nvGrpSpPr>
+        <p:cNvPr id="1" name=""/>
+        <p:cNvGrpSpPr/>
+        <p:nvPr/>
+      </p:nvGrpSpPr>
+      <p:grpSpPr>
+        <a:xfrm>
+          <a:off x="0" y="0"/>
+          <a:ext cx="0" cy="0"/>
+          <a:chOff x="0" y="0"/>
+          <a:chExt cx="0" cy="0"/>
+        </a:xfrm>
+      </p:grpSpPr>
+      <p:sp>
+        <p:nvSpPr>
+          <p:cNvPr id="2" name="标题 1"/>
+          <p:cNvSpPr>
+            <a:spLocks noGrp="1"/>
+          </p:cNvSpPr>
+          <p:nvPr>
+            <p:ph type="title"/>
+          </p:nvPr>
+        </p:nvSpPr>
+        <p:spPr/>
+        <p:txBody>
+          <a:bodyPr/>
+          <a:lstStyle/>
+          <a:p>
+            <a:r>
+              <a:rPr lang="zh-CN" altLang="en-US" dirty="0" smtClean="0"/>
+              <a:t>内建命令</a:t>
+            </a:r>
+            <a:endParaRPr lang="zh-CN" altLang="en-US" dirty="0"/>
+          </a:p>
+        </p:txBody>
+      </p:sp>
+      <p:sp>
+        <p:nvSpPr>
+          <p:cNvPr id="3" name="内容占位符 2"/>
+          <p:cNvSpPr>
+            <a:spLocks noGrp="1"/>
+          </p:cNvSpPr>
+          <p:nvPr>
+            <p:ph idx="1"/>
+          </p:nvPr>
+        </p:nvSpPr>
+        <p:spPr/>
+        <p:txBody>
+          <a:bodyPr/>
+          <a:lstStyle/>
+          <a:p>
+            <a:pPr marL="0" indent="0">
+              <a:buNone/>
+            </a:pPr>
+            <a:r>
+              <a:rPr lang="zh-CN" altLang="en-US" dirty="0"/>
+              <a:t>内建命令指的就是包含在</a:t>
+            </a:r>
+            <a:r>
+              <a:rPr lang="en-US" altLang="zh-CN" dirty="0"/>
+              <a:t>Bash</a:t>
+            </a:r>
+            <a:r>
+              <a:rPr lang="zh-CN" altLang="en-US" dirty="0"/>
+              <a:t>工具包中的</a:t>
+            </a:r>
+            <a:r>
+              <a:rPr lang="zh-CN" altLang="en-US" dirty="0" smtClean="0"/>
+              <a:t>命令</a:t>
+            </a:r>
+            <a:r>
+              <a:rPr lang="zh-CN" altLang="en-US" dirty="0"/>
+              <a:t>，</a:t>
+            </a:r>
+            <a:r>
+              <a:rPr lang="zh-CN" altLang="en-US" dirty="0" smtClean="0"/>
+              <a:t>从</a:t>
+            </a:r>
+            <a:r>
+              <a:rPr lang="zh-CN" altLang="en-US" dirty="0"/>
+              <a:t>字面意思上看就是</a:t>
+            </a:r>
+            <a:r>
+              <a:rPr lang="en-US" altLang="zh-CN" dirty="0"/>
+              <a:t>built </a:t>
+            </a:r>
+            <a:r>
+              <a:rPr lang="en-US" altLang="zh-CN" dirty="0" smtClean="0"/>
+              <a:t>in</a:t>
+            </a:r>
+            <a:r>
+              <a:rPr lang="zh-CN" altLang="en-US" dirty="0"/>
+              <a:t>。</a:t>
+            </a:r>
+            <a:r>
+              <a:rPr lang="zh-CN" altLang="en-US" dirty="0" smtClean="0"/>
+              <a:t>这</a:t>
+            </a:r>
+            <a:r>
+              <a:rPr lang="zh-CN" altLang="en-US" dirty="0"/>
+              <a:t>主要是考虑到执行效率的问题 </a:t>
+            </a:r>
+            <a:r>
+              <a:rPr lang="en-US" altLang="zh-CN" dirty="0" smtClean="0"/>
+              <a:t>-- </a:t>
+            </a:r>
+            <a:r>
+              <a:rPr lang="zh-CN" altLang="en-US" dirty="0" smtClean="0"/>
+              <a:t>内</a:t>
+            </a:r>
+            <a:r>
+              <a:rPr lang="zh-CN" altLang="en-US" dirty="0"/>
+              <a:t>建命令将比外部命令执行的更</a:t>
+            </a:r>
+            <a:r>
+              <a:rPr lang="zh-CN" altLang="en-US" dirty="0" smtClean="0"/>
+              <a:t>快</a:t>
+            </a:r>
+            <a:r>
+              <a:rPr lang="zh-CN" altLang="en-US" dirty="0"/>
+              <a:t>，</a:t>
+            </a:r>
+            <a:r>
+              <a:rPr lang="zh-CN" altLang="en-US" dirty="0" smtClean="0"/>
+              <a:t>一部分</a:t>
+            </a:r>
+            <a:r>
+              <a:rPr lang="zh-CN" altLang="en-US" dirty="0"/>
+              <a:t>原因是因为外部命令通常都需要</a:t>
+            </a:r>
+            <a:r>
+              <a:rPr lang="en-US" altLang="zh-CN" dirty="0"/>
+              <a:t>fork</a:t>
+            </a:r>
+            <a:r>
+              <a:rPr lang="zh-CN" altLang="en-US" dirty="0"/>
+              <a:t>出一个单独的进程来执行 </a:t>
+            </a:r>
+            <a:r>
+              <a:rPr lang="en-US" altLang="zh-CN" dirty="0"/>
+              <a:t>-- </a:t>
+            </a:r>
+            <a:r>
+              <a:rPr lang="zh-CN" altLang="en-US" dirty="0"/>
+              <a:t>另一部分原因是特定的内建命令需要直接访问</a:t>
+            </a:r>
+            <a:r>
+              <a:rPr lang="en-US" altLang="zh-CN" dirty="0"/>
+              <a:t>shell</a:t>
+            </a:r>
+            <a:r>
+              <a:rPr lang="zh-CN" altLang="en-US" dirty="0"/>
+              <a:t>的内核</a:t>
+            </a:r>
+            <a:r>
+              <a:rPr lang="zh-CN" altLang="en-US" dirty="0" smtClean="0"/>
+              <a:t>部分。</a:t>
+            </a:r>
+            <a:endParaRPr lang="en-US" altLang="zh-CN" dirty="0" smtClean="0"/>
+          </a:p>
+          <a:p>
+            <a:r>
+              <a:rPr lang="en-US" altLang="zh-CN" dirty="0" smtClean="0"/>
+              <a:t>I/O</a:t>
+            </a:r>
+            <a:r>
+              <a:rPr lang="zh-CN" altLang="en-US" dirty="0" smtClean="0"/>
+              <a:t>命令</a:t>
+            </a:r>
+            <a:endParaRPr lang="en-US" altLang="zh-CN" dirty="0" smtClean="0"/>
+          </a:p>
+          <a:p>
+            <a:r>
+              <a:rPr lang="zh-CN" altLang="en-US" dirty="0" smtClean="0"/>
+              <a:t>文件系统命令</a:t>
+            </a:r>
+            <a:endParaRPr lang="en-US" altLang="zh-CN" dirty="0" smtClean="0"/>
+          </a:p>
+          <a:p>
+            <a:r>
+              <a:rPr lang="zh-CN" altLang="en-US" dirty="0" smtClean="0"/>
+              <a:t>变量操作命令</a:t>
+            </a:r>
+            <a:endParaRPr lang="zh-CN" altLang="en-US" dirty="0"/>
+          </a:p>
+        </p:txBody>
+      </p:sp>
+    </p:spTree>
+    <p:extLst>
+      <p:ext uri="{BB962C8B-B14F-4D97-AF65-F5344CB8AC3E}">
+        <p14:creationId xmlns:p14="http://schemas.microsoft.com/office/powerpoint/2010/main" val="2339314732"/>
+      </p:ext>
+    </p:extLst>
+  </p:cSld>
+  <p:clrMapOvr>
+    <a:masterClrMapping/>
+  </p:clrMapOvr>
+</p:sld>
+</file>
+
+<file path=ppt/slides/slide62.xml><?xml version="1.0" encoding="utf-8"?>
+<p:sld xmlns:a="http://schemas.openxmlformats.org/drawingml/2006/main" xmlns:r="http://schemas.openxmlformats.org/officeDocument/2006/relationships" xmlns:p="http://schemas.openxmlformats.org/presentationml/2006/main">
+  <p:cSld>
+    <p:spTree>
+      <p:nvGrpSpPr>
+        <p:cNvPr id="1" name=""/>
+        <p:cNvGrpSpPr/>
+        <p:nvPr/>
+      </p:nvGrpSpPr>
+      <p:grpSpPr>
+        <a:xfrm>
+          <a:off x="0" y="0"/>
+          <a:ext cx="0" cy="0"/>
+          <a:chOff x="0" y="0"/>
+          <a:chExt cx="0" cy="0"/>
+        </a:xfrm>
+      </p:grpSpPr>
+      <p:sp>
+        <p:nvSpPr>
+          <p:cNvPr id="2" name="标题 1"/>
+          <p:cNvSpPr>
+            <a:spLocks noGrp="1"/>
+          </p:cNvSpPr>
+          <p:nvPr>
+            <p:ph type="title"/>
+          </p:nvPr>
+        </p:nvSpPr>
+        <p:spPr/>
+        <p:txBody>
+          <a:bodyPr/>
+          <a:lstStyle/>
+          <a:p>
+            <a:r>
+              <a:rPr lang="en-US" altLang="zh-CN" dirty="0" smtClean="0"/>
+              <a:t>I/O</a:t>
+            </a:r>
+            <a:r>
+              <a:rPr lang="zh-CN" altLang="en-US" dirty="0" smtClean="0"/>
+              <a:t>命令</a:t>
+            </a:r>
+            <a:endParaRPr lang="zh-CN" altLang="en-US" dirty="0"/>
+          </a:p>
+        </p:txBody>
+      </p:sp>
+      <p:sp>
+        <p:nvSpPr>
+          <p:cNvPr id="3" name="内容占位符 2"/>
+          <p:cNvSpPr>
+            <a:spLocks noGrp="1"/>
+          </p:cNvSpPr>
+          <p:nvPr>
+            <p:ph idx="1"/>
+          </p:nvPr>
+        </p:nvSpPr>
+        <p:spPr/>
+        <p:txBody>
+          <a:bodyPr/>
+          <a:lstStyle/>
+          <a:p>
+            <a:r>
+              <a:rPr lang="en-US" altLang="zh-CN" dirty="0" smtClean="0"/>
+              <a:t>echo </a:t>
+            </a:r>
+            <a:r>
+              <a:rPr lang="zh-CN" altLang="en-US" dirty="0" smtClean="0"/>
+              <a:t>打印</a:t>
+            </a:r>
+            <a:r>
+              <a:rPr lang="en-US" altLang="zh-CN" dirty="0"/>
+              <a:t>(</a:t>
+            </a:r>
+            <a:r>
+              <a:rPr lang="zh-CN" altLang="en-US" dirty="0"/>
+              <a:t>到 </a:t>
+            </a:r>
+            <a:r>
+              <a:rPr lang="en-US" altLang="zh-CN" dirty="0" err="1"/>
+              <a:t>stdout</a:t>
+            </a:r>
+            <a:r>
+              <a:rPr lang="en-US" altLang="zh-CN" dirty="0"/>
+              <a:t>)</a:t>
+            </a:r>
+            <a:r>
+              <a:rPr lang="zh-CN" altLang="en-US" dirty="0"/>
+              <a:t>一个表达式或者</a:t>
+            </a:r>
+            <a:r>
+              <a:rPr lang="zh-CN" altLang="en-US" dirty="0" smtClean="0"/>
+              <a:t>变量。</a:t>
+            </a:r>
+            <a:endParaRPr lang="en-US" altLang="zh-CN" dirty="0" smtClean="0"/>
+          </a:p>
+          <a:p>
+            <a:pPr marL="0" indent="0">
+              <a:buNone/>
+            </a:pPr>
+            <a:r>
+              <a:rPr lang="en-US" altLang="zh-CN" dirty="0"/>
+              <a:t>echo</a:t>
+            </a:r>
+            <a:r>
+              <a:rPr lang="zh-CN" altLang="en-US" dirty="0"/>
+              <a:t>命令</a:t>
+            </a:r>
+            <a:r>
+              <a:rPr lang="zh-CN" altLang="en-US" dirty="0" smtClean="0"/>
+              <a:t>需要 </a:t>
+            </a:r>
+            <a:r>
+              <a:rPr lang="en-US" altLang="zh-CN" dirty="0" smtClean="0"/>
+              <a:t>-e </a:t>
+            </a:r>
+            <a:r>
+              <a:rPr lang="zh-CN" altLang="en-US" dirty="0" smtClean="0"/>
+              <a:t>参数</a:t>
+            </a:r>
+            <a:r>
+              <a:rPr lang="zh-CN" altLang="en-US" dirty="0"/>
+              <a:t>来打印</a:t>
+            </a:r>
+            <a:r>
+              <a:rPr lang="zh-CN" altLang="en-US" dirty="0" smtClean="0"/>
+              <a:t>转义字符。</a:t>
+            </a:r>
+            <a:endParaRPr lang="en-US" altLang="zh-CN" dirty="0" smtClean="0"/>
+          </a:p>
+          <a:p>
+            <a:pPr marL="0" indent="0">
+              <a:buNone/>
+            </a:pPr>
+            <a:r>
+              <a:rPr lang="zh-CN" altLang="en-US" dirty="0"/>
+              <a:t>通常情况</a:t>
+            </a:r>
+            <a:r>
+              <a:rPr lang="zh-CN" altLang="en-US" dirty="0" smtClean="0"/>
+              <a:t>下</a:t>
+            </a:r>
+            <a:r>
+              <a:rPr lang="zh-CN" altLang="en-US" dirty="0"/>
+              <a:t>，</a:t>
+            </a:r>
+            <a:r>
+              <a:rPr lang="zh-CN" altLang="en-US" dirty="0" smtClean="0"/>
+              <a:t>每个</a:t>
+            </a:r>
+            <a:r>
+              <a:rPr lang="en-US" altLang="zh-CN" dirty="0"/>
+              <a:t>echo</a:t>
+            </a:r>
+            <a:r>
+              <a:rPr lang="zh-CN" altLang="en-US" dirty="0"/>
+              <a:t>命令都会在终端</a:t>
+            </a:r>
+            <a:r>
+              <a:rPr lang="zh-CN" altLang="en-US" dirty="0" smtClean="0"/>
+              <a:t>上打印一个新行</a:t>
+            </a:r>
+            <a:r>
+              <a:rPr lang="zh-CN" altLang="en-US" dirty="0"/>
+              <a:t>，</a:t>
+            </a:r>
+            <a:r>
+              <a:rPr lang="zh-CN" altLang="en-US" dirty="0" smtClean="0"/>
+              <a:t>但是 </a:t>
+            </a:r>
+            <a:r>
+              <a:rPr lang="en-US" altLang="zh-CN" dirty="0" smtClean="0"/>
+              <a:t>-n </a:t>
+            </a:r>
+            <a:r>
+              <a:rPr lang="zh-CN" altLang="en-US" dirty="0" smtClean="0"/>
+              <a:t>参数</a:t>
+            </a:r>
+            <a:r>
+              <a:rPr lang="zh-CN" altLang="en-US" dirty="0"/>
+              <a:t>会</a:t>
+            </a:r>
+            <a:r>
+              <a:rPr lang="zh-CN" altLang="en-US" dirty="0" smtClean="0"/>
+              <a:t>阻止</a:t>
+            </a:r>
+            <a:r>
+              <a:rPr lang="zh-CN" altLang="en-US" dirty="0"/>
+              <a:t>这</a:t>
+            </a:r>
+            <a:r>
+              <a:rPr lang="zh-CN" altLang="en-US" dirty="0" smtClean="0"/>
+              <a:t>一行为。</a:t>
+            </a:r>
+            <a:endParaRPr lang="en-US" altLang="zh-CN" dirty="0" smtClean="0"/>
+          </a:p>
+          <a:p>
+            <a:pPr marL="0" indent="0">
+              <a:buNone/>
+            </a:pPr>
+            <a:r>
+              <a:rPr lang="zh-CN" altLang="en-US" dirty="0" smtClean="0"/>
+              <a:t>可以将</a:t>
+            </a:r>
+            <a:r>
+              <a:rPr lang="en-US" altLang="zh-CN" dirty="0" smtClean="0"/>
+              <a:t>echo</a:t>
+            </a:r>
+            <a:r>
+              <a:rPr lang="zh-CN" altLang="en-US" dirty="0" smtClean="0"/>
+              <a:t>命令的输出通过</a:t>
+            </a:r>
+            <a:r>
+              <a:rPr lang="zh-CN" altLang="en-US" dirty="0"/>
+              <a:t>管道传递到一系列命令中</a:t>
+            </a:r>
+            <a:r>
+              <a:rPr lang="zh-CN" altLang="en-US" dirty="0" smtClean="0"/>
+              <a:t>去。</a:t>
+            </a:r>
+            <a:endParaRPr lang="en-US" altLang="zh-CN" dirty="0" smtClean="0"/>
+          </a:p>
+          <a:p>
+            <a:pPr marL="0" indent="0">
+              <a:buNone/>
+            </a:pPr>
+            <a:r>
+              <a:rPr lang="en-US" altLang="zh-CN" dirty="0"/>
+              <a:t>echo `command</a:t>
+            </a:r>
+            <a:r>
+              <a:rPr lang="en-US" altLang="zh-CN" dirty="0" smtClean="0"/>
+              <a:t>` </a:t>
+            </a:r>
+            <a:r>
+              <a:rPr lang="zh-CN" altLang="en-US" dirty="0" smtClean="0"/>
+              <a:t>将删除</a:t>
+            </a:r>
+            <a:r>
+              <a:rPr lang="en-US" altLang="zh-CN" dirty="0" smtClean="0"/>
+              <a:t>command</a:t>
+            </a:r>
+            <a:r>
+              <a:rPr lang="zh-CN" altLang="en-US" dirty="0"/>
+              <a:t>所产生</a:t>
+            </a:r>
+            <a:r>
+              <a:rPr lang="zh-CN" altLang="en-US" dirty="0" smtClean="0"/>
+              <a:t>的输出中所有的换行符。（注：使用</a:t>
+            </a:r>
+            <a:r>
+              <a:rPr lang="en-US" altLang="zh-CN" dirty="0" smtClean="0"/>
+              <a:t>”</a:t>
+            </a:r>
+            <a:r>
+              <a:rPr lang="zh-CN" altLang="en-US" dirty="0" smtClean="0"/>
+              <a:t>号将</a:t>
+            </a:r>
+            <a:r>
+              <a:rPr lang="en-US" altLang="zh-CN" dirty="0"/>
+              <a:t>`</a:t>
+            </a:r>
+            <a:r>
+              <a:rPr lang="en-US" altLang="zh-CN" dirty="0" smtClean="0"/>
+              <a:t>command`</a:t>
+            </a:r>
+            <a:r>
+              <a:rPr lang="zh-CN" altLang="en-US" dirty="0" smtClean="0"/>
+              <a:t>的输出引用起来，可保留输出中的换行符）</a:t>
+            </a:r>
+            <a:endParaRPr lang="en-US" altLang="zh-CN" dirty="0" smtClean="0"/>
+          </a:p>
+          <a:p>
+            <a:pPr marL="0" indent="0">
+              <a:buNone/>
+            </a:pPr>
+            <a:r>
+              <a:rPr lang="en-US" altLang="zh-CN" dirty="0" smtClean="0"/>
+              <a:t>e.g. echo.sh</a:t>
+            </a:r>
+          </a:p>
+          <a:p>
+            <a:r>
+              <a:rPr lang="en-US" altLang="zh-CN" dirty="0" err="1" smtClean="0"/>
+              <a:t>printf</a:t>
+            </a:r>
+            <a:r>
+              <a:rPr lang="en-US" altLang="zh-CN" dirty="0" smtClean="0"/>
+              <a:t> </a:t>
+            </a:r>
+            <a:r>
+              <a:rPr lang="zh-CN" altLang="en-US" dirty="0" smtClean="0"/>
+              <a:t>格式化输出，</a:t>
+            </a:r>
+            <a:r>
+              <a:rPr lang="en-US" altLang="zh-CN" dirty="0" smtClean="0"/>
+              <a:t>echo</a:t>
+            </a:r>
+            <a:r>
+              <a:rPr lang="zh-CN" altLang="en-US" dirty="0"/>
+              <a:t>命令的增强版。它是</a:t>
+            </a:r>
+            <a:r>
+              <a:rPr lang="en-US" altLang="zh-CN" dirty="0"/>
+              <a:t>C</a:t>
+            </a:r>
+            <a:r>
+              <a:rPr lang="zh-CN" altLang="en-US" dirty="0"/>
+              <a:t>语言</a:t>
+            </a:r>
+            <a:r>
+              <a:rPr lang="en-US" altLang="zh-CN" dirty="0" err="1"/>
+              <a:t>printf</a:t>
+            </a:r>
+            <a:r>
+              <a:rPr lang="en-US" altLang="zh-CN" dirty="0"/>
+              <a:t>()</a:t>
+            </a:r>
+            <a:r>
+              <a:rPr lang="zh-CN" altLang="en-US" dirty="0"/>
+              <a:t>库函数的一个有限的</a:t>
+            </a:r>
+            <a:r>
+              <a:rPr lang="zh-CN" altLang="en-US" dirty="0" smtClean="0"/>
+              <a:t>变形</a:t>
+            </a:r>
+            <a:r>
+              <a:rPr lang="zh-CN" altLang="en-US" dirty="0"/>
+              <a:t>，</a:t>
+            </a:r>
+            <a:r>
+              <a:rPr lang="zh-CN" altLang="en-US" dirty="0" smtClean="0"/>
+              <a:t>并且</a:t>
+            </a:r>
+            <a:r>
+              <a:rPr lang="zh-CN" altLang="en-US" dirty="0"/>
+              <a:t>在语法上有些</a:t>
+            </a:r>
+            <a:r>
+              <a:rPr lang="zh-CN" altLang="en-US" dirty="0" smtClean="0"/>
+              <a:t>不同。</a:t>
+            </a:r>
+            <a:endParaRPr lang="en-US" altLang="zh-CN" dirty="0" smtClean="0"/>
+          </a:p>
+          <a:p>
+            <a:pPr marL="0" indent="0">
+              <a:buNone/>
+            </a:pPr>
+            <a:r>
+              <a:rPr lang="en-US" altLang="zh-CN" dirty="0" err="1"/>
+              <a:t>printf</a:t>
+            </a:r>
+            <a:r>
+              <a:rPr lang="en-US" altLang="zh-CN" dirty="0"/>
+              <a:t> format-string... </a:t>
+            </a:r>
+            <a:r>
+              <a:rPr lang="en-US" altLang="zh-CN" dirty="0" smtClean="0"/>
+              <a:t> parameter...</a:t>
+            </a:r>
+          </a:p>
+          <a:p>
+            <a:pPr marL="0" indent="0">
+              <a:buNone/>
+            </a:pPr>
+            <a:r>
+              <a:rPr lang="en-US" altLang="zh-CN" dirty="0" smtClean="0"/>
+              <a:t>e.g. printf.sh</a:t>
+            </a:r>
+            <a:endParaRPr lang="zh-CN" altLang="en-US" dirty="0"/>
+          </a:p>
+        </p:txBody>
+      </p:sp>
+    </p:spTree>
+    <p:extLst>
+      <p:ext uri="{BB962C8B-B14F-4D97-AF65-F5344CB8AC3E}">
+        <p14:creationId xmlns:p14="http://schemas.microsoft.com/office/powerpoint/2010/main" val="598291777"/>
+      </p:ext>
+    </p:extLst>
+  </p:cSld>
+  <p:clrMapOvr>
+    <a:masterClrMapping/>
+  </p:clrMapOvr>
+</p:sld>
+</file>
+
+<file path=ppt/slides/slide63.xml><?xml version="1.0" encoding="utf-8"?>
+<p:sld xmlns:a="http://schemas.openxmlformats.org/drawingml/2006/main" xmlns:r="http://schemas.openxmlformats.org/officeDocument/2006/relationships" xmlns:p="http://schemas.openxmlformats.org/presentationml/2006/main">
+  <p:cSld>
+    <p:spTree>
+      <p:nvGrpSpPr>
+        <p:cNvPr id="1" name=""/>
+        <p:cNvGrpSpPr/>
+        <p:nvPr/>
+      </p:nvGrpSpPr>
+      <p:grpSpPr>
+        <a:xfrm>
+          <a:off x="0" y="0"/>
+          <a:ext cx="0" cy="0"/>
+          <a:chOff x="0" y="0"/>
+          <a:chExt cx="0" cy="0"/>
+        </a:xfrm>
+      </p:grpSpPr>
+      <p:sp>
+        <p:nvSpPr>
+          <p:cNvPr id="2" name="标题 1"/>
+          <p:cNvSpPr>
+            <a:spLocks noGrp="1"/>
+          </p:cNvSpPr>
+          <p:nvPr>
+            <p:ph type="title"/>
+          </p:nvPr>
+        </p:nvSpPr>
+        <p:spPr/>
+        <p:txBody>
+          <a:bodyPr/>
+          <a:lstStyle/>
+          <a:p>
+            <a:r>
+              <a:rPr lang="zh-CN" altLang="en-US" dirty="0" smtClean="0"/>
+              <a:t>高级主题</a:t>
+            </a:r>
+            <a:endParaRPr lang="zh-CN" altLang="en-US" dirty="0"/>
+          </a:p>
+        </p:txBody>
+      </p:sp>
+      <p:sp>
+        <p:nvSpPr>
+          <p:cNvPr id="3" name="内容占位符 2"/>
+          <p:cNvSpPr>
+            <a:spLocks noGrp="1"/>
+          </p:cNvSpPr>
+          <p:nvPr>
+            <p:ph idx="1"/>
+          </p:nvPr>
+        </p:nvSpPr>
+        <p:spPr/>
+        <p:txBody>
+          <a:bodyPr/>
+          <a:lstStyle/>
+          <a:p>
+            <a:r>
+              <a:rPr lang="zh-CN" altLang="en-US" dirty="0" smtClean="0"/>
+              <a:t>数组</a:t>
+            </a:r>
+            <a:endParaRPr lang="en-US" altLang="zh-CN" dirty="0" smtClean="0"/>
+          </a:p>
+          <a:p>
+            <a:r>
+              <a:rPr lang="en-US" altLang="zh-CN" dirty="0" smtClean="0"/>
+              <a:t>I/O</a:t>
+            </a:r>
+            <a:r>
+              <a:rPr lang="zh-CN" altLang="en-US" dirty="0" smtClean="0"/>
+              <a:t>重定向</a:t>
+            </a:r>
+            <a:endParaRPr lang="en-US" altLang="zh-CN" dirty="0" smtClean="0"/>
+          </a:p>
+          <a:p>
+            <a:r>
+              <a:rPr lang="zh-CN" altLang="en-US" dirty="0" smtClean="0"/>
+              <a:t>间接引用</a:t>
+            </a:r>
+            <a:endParaRPr lang="en-US" altLang="zh-CN" dirty="0" smtClean="0"/>
+          </a:p>
+          <a:p>
+            <a:r>
+              <a:rPr lang="zh-CN" altLang="en-US" dirty="0" smtClean="0"/>
+              <a:t>函数</a:t>
+            </a:r>
+            <a:endParaRPr lang="en-US" altLang="zh-CN" dirty="0" smtClean="0"/>
+          </a:p>
+          <a:p>
+            <a:r>
+              <a:rPr lang="zh-CN" altLang="en-US" dirty="0" smtClean="0"/>
+              <a:t>子</a:t>
+            </a:r>
+            <a:r>
+              <a:rPr lang="en-US" altLang="zh-CN" dirty="0" smtClean="0"/>
+              <a:t>shell</a:t>
+            </a:r>
+          </a:p>
+          <a:p>
+            <a:r>
+              <a:rPr lang="en-US" altLang="zh-CN" dirty="0"/>
+              <a:t>Here </a:t>
+            </a:r>
+            <a:r>
+              <a:rPr lang="en-US" altLang="zh-CN" dirty="0" smtClean="0"/>
+              <a:t>Documents</a:t>
+            </a:r>
+          </a:p>
+          <a:p>
+            <a:r>
+              <a:rPr lang="zh-CN" altLang="en-US" dirty="0" smtClean="0"/>
+              <a:t>正则表达式</a:t>
+            </a:r>
+            <a:endParaRPr lang="en-US" altLang="zh-CN" dirty="0" smtClean="0"/>
+          </a:p>
+          <a:p>
+            <a:endParaRPr lang="zh-CN" altLang="en-US" dirty="0"/>
+          </a:p>
+        </p:txBody>
+      </p:sp>
+    </p:spTree>
+    <p:extLst>
+      <p:ext uri="{BB962C8B-B14F-4D97-AF65-F5344CB8AC3E}">
+        <p14:creationId xmlns:p14="http://schemas.microsoft.com/office/powerpoint/2010/main" val="236508047"/>
+      </p:ext>
+    </p:extLst>
+  </p:cSld>
+  <p:clrMapOvr>
+    <a:masterClrMapping/>
+  </p:clrMapOvr>
+</p:sld>
+</file>
+
+<file path=ppt/slides/slide64.xml><?xml version="1.0" encoding="utf-8"?>
+<p:sld xmlns:a="http://schemas.openxmlformats.org/drawingml/2006/main" xmlns:r="http://schemas.openxmlformats.org/officeDocument/2006/relationships" xmlns:p="http://schemas.openxmlformats.org/presentationml/2006/main">
+  <p:cSld>
+    <p:spTree>
+      <p:nvGrpSpPr>
+        <p:cNvPr id="1" name=""/>
+        <p:cNvGrpSpPr/>
+        <p:nvPr/>
+      </p:nvGrpSpPr>
+      <p:grpSpPr>
+        <a:xfrm>
+          <a:off x="0" y="0"/>
+          <a:ext cx="0" cy="0"/>
+          <a:chOff x="0" y="0"/>
+          <a:chExt cx="0" cy="0"/>
+        </a:xfrm>
+      </p:grpSpPr>
+      <p:sp>
+        <p:nvSpPr>
+          <p:cNvPr id="2" name="标题 1"/>
+          <p:cNvSpPr>
+            <a:spLocks noGrp="1"/>
+          </p:cNvSpPr>
+          <p:nvPr>
+            <p:ph type="title"/>
+          </p:nvPr>
+        </p:nvSpPr>
+        <p:spPr/>
+        <p:txBody>
+          <a:bodyPr/>
+          <a:lstStyle/>
+          <a:p>
+            <a:r>
+              <a:rPr lang="zh-CN" altLang="en-US" dirty="0" smtClean="0"/>
+              <a:t>实用工具</a:t>
+            </a:r>
+            <a:endParaRPr lang="zh-CN" altLang="en-US" dirty="0"/>
+          </a:p>
+        </p:txBody>
+      </p:sp>
+      <p:sp>
+        <p:nvSpPr>
+          <p:cNvPr id="3" name="内容占位符 2"/>
+          <p:cNvSpPr>
+            <a:spLocks noGrp="1"/>
+          </p:cNvSpPr>
+          <p:nvPr>
+            <p:ph idx="1"/>
+          </p:nvPr>
+        </p:nvSpPr>
+        <p:spPr/>
+        <p:txBody>
+          <a:bodyPr/>
+          <a:lstStyle/>
+          <a:p>
+            <a:r>
+              <a:rPr lang="en-US" altLang="zh-CN" dirty="0" smtClean="0"/>
+              <a:t>cut </a:t>
+            </a:r>
+            <a:r>
+              <a:rPr lang="zh-CN" altLang="en-US" dirty="0" smtClean="0"/>
+              <a:t>的用法</a:t>
+            </a:r>
+            <a:endParaRPr lang="en-US" altLang="zh-CN" dirty="0"/>
+          </a:p>
+          <a:p>
+            <a:r>
+              <a:rPr lang="en-US" altLang="zh-CN" dirty="0" smtClean="0"/>
+              <a:t>grep </a:t>
+            </a:r>
+            <a:r>
+              <a:rPr lang="zh-CN" altLang="en-US" dirty="0" smtClean="0"/>
+              <a:t>的用法</a:t>
+            </a:r>
+            <a:endParaRPr lang="en-US" altLang="zh-CN" dirty="0" smtClean="0"/>
+          </a:p>
+          <a:p>
+            <a:r>
+              <a:rPr lang="en-US" altLang="zh-CN" dirty="0" smtClean="0"/>
+              <a:t>sed </a:t>
+            </a:r>
+            <a:r>
+              <a:rPr lang="zh-CN" altLang="en-US" dirty="0" smtClean="0"/>
+              <a:t>的用法</a:t>
+            </a:r>
+            <a:endParaRPr lang="en-US" altLang="zh-CN" dirty="0" smtClean="0"/>
+          </a:p>
+          <a:p>
+            <a:r>
+              <a:rPr lang="en-US" altLang="zh-CN" dirty="0" smtClean="0"/>
+              <a:t>awk </a:t>
+            </a:r>
+            <a:r>
+              <a:rPr lang="zh-CN" altLang="en-US" dirty="0" smtClean="0"/>
+              <a:t>的用法</a:t>
+            </a:r>
+            <a:endParaRPr lang="en-US" altLang="zh-CN" dirty="0" smtClean="0"/>
+          </a:p>
+          <a:p>
+            <a:endParaRPr lang="zh-CN" altLang="en-US" dirty="0"/>
+          </a:p>
+        </p:txBody>
+      </p:sp>
+    </p:spTree>
+    <p:extLst>
+      <p:ext uri="{BB962C8B-B14F-4D97-AF65-F5344CB8AC3E}">
+        <p14:creationId xmlns:p14="http://schemas.microsoft.com/office/powerpoint/2010/main" val="2492421797"/>
+      </p:ext>
+    </p:extLst>
+  </p:cSld>
+  <p:clrMapOvr>
+    <a:masterClrMapping/>
+  </p:clrMapOvr>
+  <p:timing>
+    <p:tnLst>
+      <p:par>
+        <p:cTn id="1" dur="indefinite" restart="never" nodeType="tmRoot"/>
+      </p:par>
+    </p:tnLst>
+  </p:timing>
+</p:sld>
+</file>
+
+<file path=ppt/slides/slide65.xml><?xml version="1.0" encoding="utf-8"?>
+<p:sld xmlns:a="http://schemas.openxmlformats.org/drawingml/2006/main" xmlns:r="http://schemas.openxmlformats.org/officeDocument/2006/relationships" xmlns:p="http://schemas.openxmlformats.org/presentationml/2006/main">
+  <p:cSld>
+    <p:spTree>
+      <p:nvGrpSpPr>
+        <p:cNvPr id="1" name=""/>
+        <p:cNvGrpSpPr/>
+        <p:nvPr/>
+      </p:nvGrpSpPr>
+      <p:grpSpPr>
+        <a:xfrm>
+          <a:off x="0" y="0"/>
+          <a:ext cx="0" cy="0"/>
+          <a:chOff x="0" y="0"/>
+          <a:chExt cx="0" cy="0"/>
+        </a:xfrm>
+      </p:grpSpPr>
+      <p:sp>
+        <p:nvSpPr>
+          <p:cNvPr id="2" name="标题 1"/>
+          <p:cNvSpPr>
+            <a:spLocks noGrp="1"/>
+          </p:cNvSpPr>
+          <p:nvPr>
+            <p:ph type="title"/>
+          </p:nvPr>
+        </p:nvSpPr>
+        <p:spPr/>
+        <p:txBody>
+          <a:bodyPr/>
+          <a:lstStyle/>
+          <a:p>
+            <a:r>
+              <a:rPr lang="zh-CN" altLang="en-US" dirty="0"/>
+              <a:t>参考</a:t>
+            </a:r>
+          </a:p>
+        </p:txBody>
+      </p:sp>
+      <p:sp>
+        <p:nvSpPr>
+          <p:cNvPr id="3" name="内容占位符 2"/>
+          <p:cNvSpPr>
+            <a:spLocks noGrp="1"/>
+          </p:cNvSpPr>
+          <p:nvPr>
+            <p:ph idx="1"/>
+          </p:nvPr>
+        </p:nvSpPr>
+        <p:spPr/>
+        <p:txBody>
+          <a:bodyPr>
+            <a:normAutofit/>
+          </a:bodyPr>
+          <a:lstStyle/>
+          <a:p>
+            <a:r>
+              <a:rPr lang="en-US" altLang="zh-CN" dirty="0" smtClean="0"/>
+              <a:t>Advanced </a:t>
+            </a:r>
+            <a:r>
+              <a:rPr lang="en-US" altLang="zh-CN" dirty="0"/>
+              <a:t>Bash-Scripting Guide</a:t>
+            </a:r>
+            <a:r>
+              <a:rPr lang="zh-CN" altLang="en-US" dirty="0" smtClean="0"/>
+              <a:t>：</a:t>
+            </a:r>
+            <a:endParaRPr lang="en-US" altLang="zh-CN" dirty="0" smtClean="0"/>
+          </a:p>
+          <a:p>
+            <a:pPr marL="0" indent="0">
+              <a:buNone/>
+            </a:pPr>
+            <a:r>
+              <a:rPr lang="en-US" altLang="zh-CN" dirty="0" smtClean="0">
+                <a:hlinkClick r:id="rId2"/>
+              </a:rPr>
+              <a:t>http://www.tldp.org/LDP/abs/html/abs-guide.html</a:t>
+            </a:r>
+            <a:endParaRPr lang="en-US" altLang="zh-CN" dirty="0"/>
+          </a:p>
+          <a:p>
+            <a:r>
+              <a:rPr lang="en-US" altLang="zh-CN" dirty="0" smtClean="0"/>
+              <a:t>sed </a:t>
+            </a:r>
+            <a:r>
+              <a:rPr lang="en-US" altLang="zh-CN" dirty="0"/>
+              <a:t>&amp; awk </a:t>
+            </a:r>
+            <a:r>
+              <a:rPr lang="zh-CN" altLang="en-US" dirty="0" smtClean="0"/>
+              <a:t>概述</a:t>
+            </a:r>
+            <a:endParaRPr lang="en-US" altLang="zh-CN" dirty="0" smtClean="0"/>
+          </a:p>
+          <a:p>
+            <a:pPr marL="0" indent="0">
+              <a:buNone/>
+            </a:pPr>
+            <a:r>
+              <a:rPr lang="en-US" altLang="zh-CN" dirty="0" smtClean="0">
+                <a:hlinkClick r:id="rId3"/>
+              </a:rPr>
+              <a:t>http://jarson.in/sed-awk-overview/</a:t>
+            </a:r>
+            <a:endParaRPr lang="en-US" altLang="zh-CN" dirty="0" smtClean="0"/>
+          </a:p>
+          <a:p>
+            <a:r>
+              <a:rPr lang="en-US" altLang="zh-CN" dirty="0" smtClean="0"/>
+              <a:t>sed </a:t>
+            </a:r>
+            <a:r>
+              <a:rPr lang="zh-CN" altLang="en-US" dirty="0"/>
+              <a:t>学习</a:t>
+            </a:r>
+            <a:r>
+              <a:rPr lang="zh-CN" altLang="en-US" dirty="0" smtClean="0"/>
+              <a:t>手册</a:t>
+            </a:r>
+            <a:endParaRPr lang="en-US" altLang="zh-CN" dirty="0" smtClean="0"/>
+          </a:p>
+          <a:p>
+            <a:pPr marL="0" indent="0">
+              <a:buNone/>
+            </a:pPr>
+            <a:r>
+              <a:rPr lang="en-US" altLang="zh-CN" dirty="0" smtClean="0">
+                <a:hlinkClick r:id="rId4"/>
+              </a:rPr>
+              <a:t>http://jarson.in/sed-manual/</a:t>
+            </a:r>
+            <a:endParaRPr lang="en-US" altLang="zh-CN" dirty="0" smtClean="0"/>
+          </a:p>
+          <a:p>
+            <a:r>
+              <a:rPr lang="en-US" altLang="zh-CN" dirty="0" smtClean="0"/>
+              <a:t>sed </a:t>
+            </a:r>
+            <a:r>
+              <a:rPr lang="zh-CN" altLang="en-US" dirty="0"/>
+              <a:t>函数</a:t>
+            </a:r>
+            <a:r>
+              <a:rPr lang="zh-CN" altLang="en-US" dirty="0" smtClean="0"/>
+              <a:t>参数</a:t>
+            </a:r>
+            <a:endParaRPr lang="en-US" altLang="zh-CN" dirty="0" smtClean="0"/>
+          </a:p>
+          <a:p>
+            <a:pPr marL="0" indent="0">
+              <a:buNone/>
+            </a:pPr>
+            <a:r>
+              <a:rPr lang="en-US" altLang="zh-CN" dirty="0" smtClean="0">
+                <a:hlinkClick r:id="rId5"/>
+              </a:rPr>
+              <a:t>http://jarson.in/sed-functions/</a:t>
+            </a:r>
+            <a:endParaRPr lang="en-US" altLang="zh-CN" dirty="0"/>
+          </a:p>
+          <a:p>
+            <a:r>
+              <a:rPr lang="en-US" altLang="zh-CN" dirty="0" smtClean="0"/>
+              <a:t>awk</a:t>
+            </a:r>
+          </a:p>
+          <a:p>
+            <a:pPr marL="0" indent="0">
+              <a:buNone/>
+            </a:pPr>
+            <a:r>
+              <a:rPr lang="en-US" altLang="zh-CN" dirty="0" smtClean="0">
+                <a:hlinkClick r:id="rId6"/>
+              </a:rPr>
+              <a:t>http://www.aslibra.com/doc/awk.htm</a:t>
+            </a:r>
+            <a:endParaRPr lang="zh-CN" altLang="en-US" dirty="0"/>
+          </a:p>
+        </p:txBody>
+      </p:sp>
+    </p:spTree>
+    <p:extLst>
+      <p:ext uri="{BB962C8B-B14F-4D97-AF65-F5344CB8AC3E}">
+        <p14:creationId xmlns:p14="http://schemas.microsoft.com/office/powerpoint/2010/main" val="893627498"/>
       </p:ext>
     </p:extLst>
   </p:cSld>

</xml_diff>